<commit_message>
DIAGRAMA DE FLUJO BANERSNATCH CORREGIDO
El diagrama pasado tenia unos errores, este ya esta corregido
</commit_message>
<xml_diff>
--- a/bandersnatch.pptx
+++ b/bandersnatch.pptx
@@ -3509,54 +3509,6 @@
       </p:sp>
       <p:sp>
         <p:nvSpPr>
-          <p:cNvPr id="5" name="Rectángulo 4">
-            <a:extLst>
-              <a:ext uri="{FF2B5EF4-FFF2-40B4-BE49-F238E27FC236}">
-                <a16:creationId xmlns:a16="http://schemas.microsoft.com/office/drawing/2014/main" id="{39F09DA1-FD77-4B85-9731-913296345F5E}"/>
-              </a:ext>
-            </a:extLst>
-          </p:cNvPr>
-          <p:cNvSpPr/>
-          <p:nvPr/>
-        </p:nvSpPr>
-        <p:spPr>
-          <a:xfrm>
-            <a:off x="6506818" y="606419"/>
-            <a:ext cx="1099931" cy="357809"/>
-          </a:xfrm>
-          <a:prstGeom prst="rect">
-            <a:avLst/>
-          </a:prstGeom>
-        </p:spPr>
-        <p:style>
-          <a:lnRef idx="2">
-            <a:schemeClr val="accent3"/>
-          </a:lnRef>
-          <a:fillRef idx="1">
-            <a:schemeClr val="lt1"/>
-          </a:fillRef>
-          <a:effectRef idx="0">
-            <a:schemeClr val="accent3"/>
-          </a:effectRef>
-          <a:fontRef idx="minor">
-            <a:schemeClr val="dk1"/>
-          </a:fontRef>
-        </p:style>
-        <p:txBody>
-          <a:bodyPr rtlCol="0" anchor="ctr"/>
-          <a:lstStyle/>
-          <a:p>
-            <a:pPr algn="ctr"/>
-            <a:r>
-              <a:rPr lang="es-MX" dirty="0" err="1"/>
-              <a:t>Frosties</a:t>
-            </a:r>
-            <a:endParaRPr lang="es-MX" dirty="0"/>
-          </a:p>
-        </p:txBody>
-      </p:sp>
-      <p:sp>
-        <p:nvSpPr>
           <p:cNvPr id="9" name="Rectángulo 8">
             <a:extLst>
               <a:ext uri="{FF2B5EF4-FFF2-40B4-BE49-F238E27FC236}">
@@ -3661,14 +3613,12 @@
               </a:ext>
             </a:extLst>
           </p:cNvPr>
-          <p:cNvCxnSpPr>
-            <a:endCxn id="5" idx="1"/>
-          </p:cNvCxnSpPr>
+          <p:cNvCxnSpPr/>
           <p:nvPr/>
         </p:nvCxnSpPr>
         <p:spPr>
           <a:xfrm>
-            <a:off x="6029739" y="785323"/>
+            <a:off x="6029738" y="785323"/>
             <a:ext cx="477079" cy="1"/>
           </a:xfrm>
           <a:prstGeom prst="straightConnector1">
@@ -3698,10 +3648,10 @@
       </p:cxnSp>
       <p:sp>
         <p:nvSpPr>
-          <p:cNvPr id="16" name="Rectángulo 15">
-            <a:extLst>
-              <a:ext uri="{FF2B5EF4-FFF2-40B4-BE49-F238E27FC236}">
-                <a16:creationId xmlns:a16="http://schemas.microsoft.com/office/drawing/2014/main" id="{A62B5DBA-22C5-47E6-AB9F-FF768BCD0010}"/>
+          <p:cNvPr id="17" name="Rectángulo 16">
+            <a:extLst>
+              <a:ext uri="{FF2B5EF4-FFF2-40B4-BE49-F238E27FC236}">
+                <a16:creationId xmlns:a16="http://schemas.microsoft.com/office/drawing/2014/main" id="{002521C6-5E12-44B1-B72A-B83EE5B9801A}"/>
               </a:ext>
             </a:extLst>
           </p:cNvPr>
@@ -3710,59 +3660,7 @@
         </p:nvSpPr>
         <p:spPr>
           <a:xfrm>
-            <a:off x="4678018" y="1143133"/>
-            <a:ext cx="1729410" cy="334729"/>
-          </a:xfrm>
-          <a:prstGeom prst="rect">
-            <a:avLst/>
-          </a:prstGeom>
-        </p:spPr>
-        <p:style>
-          <a:lnRef idx="2">
-            <a:schemeClr val="accent3"/>
-          </a:lnRef>
-          <a:fillRef idx="1">
-            <a:schemeClr val="lt1"/>
-          </a:fillRef>
-          <a:effectRef idx="0">
-            <a:schemeClr val="accent3"/>
-          </a:effectRef>
-          <a:fontRef idx="minor">
-            <a:schemeClr val="dk1"/>
-          </a:fontRef>
-        </p:style>
-        <p:txBody>
-          <a:bodyPr rtlCol="0" anchor="ctr"/>
-          <a:lstStyle/>
-          <a:p>
-            <a:pPr algn="ctr"/>
-            <a:r>
-              <a:rPr lang="es-MX" dirty="0"/>
-              <a:t>Thompson </a:t>
-            </a:r>
-            <a:r>
-              <a:rPr lang="es-MX" dirty="0" err="1"/>
-              <a:t>twins</a:t>
-            </a:r>
-            <a:endParaRPr lang="es-MX" dirty="0"/>
-          </a:p>
-        </p:txBody>
-      </p:sp>
-      <p:sp>
-        <p:nvSpPr>
-          <p:cNvPr id="17" name="Rectángulo 16">
-            <a:extLst>
-              <a:ext uri="{FF2B5EF4-FFF2-40B4-BE49-F238E27FC236}">
-                <a16:creationId xmlns:a16="http://schemas.microsoft.com/office/drawing/2014/main" id="{002521C6-5E12-44B1-B72A-B83EE5B9801A}"/>
-              </a:ext>
-            </a:extLst>
-          </p:cNvPr>
-          <p:cNvSpPr/>
-          <p:nvPr/>
-        </p:nvSpPr>
-        <p:spPr>
-          <a:xfrm>
-            <a:off x="7394713" y="1143133"/>
+            <a:off x="7696200" y="1095536"/>
             <a:ext cx="861391" cy="334729"/>
           </a:xfrm>
           <a:prstGeom prst="rect">
@@ -3809,18 +3707,20 @@
             </a:extLst>
           </p:cNvPr>
           <p:cNvCxnSpPr>
-            <a:stCxn id="5" idx="2"/>
-            <a:endCxn id="16" idx="3"/>
+            <a:cxnSpLocks/>
+            <a:endCxn id="53" idx="3"/>
           </p:cNvCxnSpPr>
           <p:nvPr/>
         </p:nvCxnSpPr>
         <p:spPr>
-          <a:xfrm rot="5400000">
-            <a:off x="6558971" y="812685"/>
-            <a:ext cx="346270" cy="649356"/>
-          </a:xfrm>
-          <a:prstGeom prst="bentConnector2">
-            <a:avLst/>
+          <a:xfrm rot="10800000" flipV="1">
+            <a:off x="6389206" y="1024697"/>
+            <a:ext cx="988942" cy="262080"/>
+          </a:xfrm>
+          <a:prstGeom prst="bentConnector3">
+            <a:avLst>
+              <a:gd name="adj1" fmla="val 419"/>
+            </a:avLst>
           </a:prstGeom>
           <a:ln>
             <a:solidFill>
@@ -3860,7 +3760,7 @@
         </p:nvCxnSpPr>
         <p:spPr>
           <a:xfrm>
-            <a:off x="7076661" y="1310497"/>
+            <a:off x="7378148" y="1262900"/>
             <a:ext cx="318052" cy="1"/>
           </a:xfrm>
           <a:prstGeom prst="bentConnector3">
@@ -3885,100 +3785,6 @@
           </a:fontRef>
         </p:style>
       </p:cxnSp>
-      <p:sp>
-        <p:nvSpPr>
-          <p:cNvPr id="24" name="Rectángulo 23">
-            <a:extLst>
-              <a:ext uri="{FF2B5EF4-FFF2-40B4-BE49-F238E27FC236}">
-                <a16:creationId xmlns:a16="http://schemas.microsoft.com/office/drawing/2014/main" id="{AD4E2DF0-9310-47BD-B838-54B003939A7B}"/>
-              </a:ext>
-            </a:extLst>
-          </p:cNvPr>
-          <p:cNvSpPr/>
-          <p:nvPr/>
-        </p:nvSpPr>
-        <p:spPr>
-          <a:xfrm>
-            <a:off x="2835965" y="1775791"/>
-            <a:ext cx="1908315" cy="357809"/>
-          </a:xfrm>
-          <a:prstGeom prst="rect">
-            <a:avLst/>
-          </a:prstGeom>
-        </p:spPr>
-        <p:style>
-          <a:lnRef idx="2">
-            <a:schemeClr val="accent3"/>
-          </a:lnRef>
-          <a:fillRef idx="1">
-            <a:schemeClr val="lt1"/>
-          </a:fillRef>
-          <a:effectRef idx="0">
-            <a:schemeClr val="accent3"/>
-          </a:effectRef>
-          <a:fontRef idx="minor">
-            <a:schemeClr val="dk1"/>
-          </a:fontRef>
-        </p:style>
-        <p:txBody>
-          <a:bodyPr rtlCol="0" anchor="ctr"/>
-          <a:lstStyle/>
-          <a:p>
-            <a:pPr algn="ctr"/>
-            <a:r>
-              <a:rPr lang="es-MX" dirty="0"/>
-              <a:t>Aceptar propuesta</a:t>
-            </a:r>
-          </a:p>
-        </p:txBody>
-      </p:sp>
-      <p:sp>
-        <p:nvSpPr>
-          <p:cNvPr id="25" name="Rectángulo 24">
-            <a:extLst>
-              <a:ext uri="{FF2B5EF4-FFF2-40B4-BE49-F238E27FC236}">
-                <a16:creationId xmlns:a16="http://schemas.microsoft.com/office/drawing/2014/main" id="{7F8DE659-2114-4C2A-91B0-187BC3EEDC54}"/>
-              </a:ext>
-            </a:extLst>
-          </p:cNvPr>
-          <p:cNvSpPr/>
-          <p:nvPr/>
-        </p:nvSpPr>
-        <p:spPr>
-          <a:xfrm>
-            <a:off x="5055704" y="1775790"/>
-            <a:ext cx="2020957" cy="357809"/>
-          </a:xfrm>
-          <a:prstGeom prst="rect">
-            <a:avLst/>
-          </a:prstGeom>
-        </p:spPr>
-        <p:style>
-          <a:lnRef idx="2">
-            <a:schemeClr val="accent3"/>
-          </a:lnRef>
-          <a:fillRef idx="1">
-            <a:schemeClr val="lt1"/>
-          </a:fillRef>
-          <a:effectRef idx="0">
-            <a:schemeClr val="accent3"/>
-          </a:effectRef>
-          <a:fontRef idx="minor">
-            <a:schemeClr val="dk1"/>
-          </a:fontRef>
-        </p:style>
-        <p:txBody>
-          <a:bodyPr rtlCol="0" anchor="ctr"/>
-          <a:lstStyle/>
-          <a:p>
-            <a:pPr algn="ctr"/>
-            <a:r>
-              <a:rPr lang="es-MX" dirty="0"/>
-              <a:t>Rechazar propuesta</a:t>
-            </a:r>
-          </a:p>
-        </p:txBody>
-      </p:sp>
       <p:cxnSp>
         <p:nvCxnSpPr>
           <p:cNvPr id="27" name="Conector: angular 26">
@@ -3989,15 +3795,16 @@
             </a:extLst>
           </p:cNvPr>
           <p:cNvCxnSpPr>
-            <a:stCxn id="16" idx="2"/>
-            <a:endCxn id="25" idx="0"/>
+            <a:cxnSpLocks/>
+            <a:stCxn id="53" idx="2"/>
+            <a:endCxn id="94" idx="0"/>
           </p:cNvCxnSpPr>
           <p:nvPr/>
         </p:nvCxnSpPr>
         <p:spPr>
           <a:xfrm rot="16200000" flipH="1">
-            <a:off x="5655489" y="1365096"/>
-            <a:ext cx="297928" cy="523460"/>
+            <a:off x="5543471" y="1216076"/>
+            <a:ext cx="165808" cy="806725"/>
           </a:xfrm>
           <a:prstGeom prst="bentConnector3">
             <a:avLst/>
@@ -4034,18 +3841,21 @@
             </a:extLst>
           </p:cNvPr>
           <p:cNvCxnSpPr>
-            <a:stCxn id="16" idx="2"/>
-            <a:endCxn id="24" idx="0"/>
+            <a:cxnSpLocks/>
+            <a:stCxn id="53" idx="2"/>
+            <a:endCxn id="65" idx="0"/>
           </p:cNvCxnSpPr>
           <p:nvPr/>
         </p:nvCxnSpPr>
         <p:spPr>
           <a:xfrm rot="5400000">
-            <a:off x="4517459" y="750526"/>
-            <a:ext cx="297929" cy="1752600"/>
+            <a:off x="4028364" y="458848"/>
+            <a:ext cx="116962" cy="2272337"/>
           </a:xfrm>
           <a:prstGeom prst="bentConnector3">
-            <a:avLst/>
+            <a:avLst>
+              <a:gd name="adj1" fmla="val -6653"/>
+            </a:avLst>
           </a:prstGeom>
           <a:ln>
             <a:tailEnd type="triangle"/>
@@ -4068,10 +3878,10 @@
       </p:cxnSp>
       <p:sp>
         <p:nvSpPr>
-          <p:cNvPr id="33" name="Rectángulo 32">
-            <a:extLst>
-              <a:ext uri="{FF2B5EF4-FFF2-40B4-BE49-F238E27FC236}">
-                <a16:creationId xmlns:a16="http://schemas.microsoft.com/office/drawing/2014/main" id="{F2ADDAA7-FDA9-4150-989A-BFDCF9FF087D}"/>
+          <p:cNvPr id="35" name="Rectángulo 34">
+            <a:extLst>
+              <a:ext uri="{FF2B5EF4-FFF2-40B4-BE49-F238E27FC236}">
+                <a16:creationId xmlns:a16="http://schemas.microsoft.com/office/drawing/2014/main" id="{6ED70C70-C4FB-459D-8D9A-0A0358342B1C}"/>
               </a:ext>
             </a:extLst>
           </p:cNvPr>
@@ -4080,54 +3890,7 @@
         </p:nvSpPr>
         <p:spPr>
           <a:xfrm>
-            <a:off x="3867979" y="2326243"/>
-            <a:ext cx="1752601" cy="357809"/>
-          </a:xfrm>
-          <a:prstGeom prst="rect">
-            <a:avLst/>
-          </a:prstGeom>
-        </p:spPr>
-        <p:style>
-          <a:lnRef idx="2">
-            <a:schemeClr val="accent3"/>
-          </a:lnRef>
-          <a:fillRef idx="1">
-            <a:schemeClr val="lt1"/>
-          </a:fillRef>
-          <a:effectRef idx="0">
-            <a:schemeClr val="accent3"/>
-          </a:effectRef>
-          <a:fontRef idx="minor">
-            <a:schemeClr val="dk1"/>
-          </a:fontRef>
-        </p:style>
-        <p:txBody>
-          <a:bodyPr rtlCol="0" anchor="ctr"/>
-          <a:lstStyle/>
-          <a:p>
-            <a:pPr algn="ctr"/>
-            <a:r>
-              <a:rPr lang="es-MX" dirty="0"/>
-              <a:t>Hablar de mamá</a:t>
-            </a:r>
-          </a:p>
-        </p:txBody>
-      </p:sp>
-      <p:sp>
-        <p:nvSpPr>
-          <p:cNvPr id="35" name="Rectángulo 34">
-            <a:extLst>
-              <a:ext uri="{FF2B5EF4-FFF2-40B4-BE49-F238E27FC236}">
-                <a16:creationId xmlns:a16="http://schemas.microsoft.com/office/drawing/2014/main" id="{6ED70C70-C4FB-459D-8D9A-0A0358342B1C}"/>
-              </a:ext>
-            </a:extLst>
-          </p:cNvPr>
-          <p:cNvSpPr/>
-          <p:nvPr/>
-        </p:nvSpPr>
-        <p:spPr>
-          <a:xfrm>
-            <a:off x="6096000" y="2332867"/>
+            <a:off x="6404939" y="2726268"/>
             <a:ext cx="2020957" cy="357809"/>
           </a:xfrm>
           <a:prstGeom prst="rect">
@@ -4170,18 +3933,21 @@
             </a:extLst>
           </p:cNvPr>
           <p:cNvCxnSpPr>
-            <a:stCxn id="25" idx="2"/>
+            <a:cxnSpLocks/>
+            <a:stCxn id="94" idx="2"/>
             <a:endCxn id="35" idx="0"/>
           </p:cNvCxnSpPr>
           <p:nvPr/>
         </p:nvCxnSpPr>
         <p:spPr>
           <a:xfrm rot="16200000" flipH="1">
-            <a:off x="6486697" y="1713085"/>
-            <a:ext cx="199268" cy="1040296"/>
+            <a:off x="6460374" y="1771224"/>
+            <a:ext cx="524408" cy="1385680"/>
           </a:xfrm>
           <a:prstGeom prst="bentConnector3">
-            <a:avLst/>
+            <a:avLst>
+              <a:gd name="adj1" fmla="val 50000"/>
+            </a:avLst>
           </a:prstGeom>
           <a:ln>
             <a:tailEnd type="triangle"/>
@@ -4212,18 +3978,21 @@
             </a:extLst>
           </p:cNvPr>
           <p:cNvCxnSpPr>
-            <a:stCxn id="25" idx="2"/>
-            <a:endCxn id="33" idx="0"/>
+            <a:cxnSpLocks/>
+            <a:stCxn id="94" idx="2"/>
+            <a:endCxn id="110" idx="0"/>
           </p:cNvCxnSpPr>
           <p:nvPr/>
         </p:nvCxnSpPr>
         <p:spPr>
           <a:xfrm rot="5400000">
-            <a:off x="5308910" y="1568970"/>
-            <a:ext cx="192644" cy="1321903"/>
+            <a:off x="5286602" y="1673204"/>
+            <a:ext cx="214480" cy="1271793"/>
           </a:xfrm>
           <a:prstGeom prst="bentConnector3">
-            <a:avLst/>
+            <a:avLst>
+              <a:gd name="adj1" fmla="val 50000"/>
+            </a:avLst>
           </a:prstGeom>
           <a:ln>
             <a:solidFill>
@@ -4249,10 +4018,10 @@
       </p:cxnSp>
       <p:sp>
         <p:nvSpPr>
-          <p:cNvPr id="40" name="Rectángulo 39">
-            <a:extLst>
-              <a:ext uri="{FF2B5EF4-FFF2-40B4-BE49-F238E27FC236}">
-                <a16:creationId xmlns:a16="http://schemas.microsoft.com/office/drawing/2014/main" id="{754C8BFD-3001-4264-9D2D-0F8C74F06CB2}"/>
+          <p:cNvPr id="44" name="Rectángulo 43">
+            <a:extLst>
+              <a:ext uri="{FF2B5EF4-FFF2-40B4-BE49-F238E27FC236}">
+                <a16:creationId xmlns:a16="http://schemas.microsoft.com/office/drawing/2014/main" id="{4B2148B7-4201-444A-A6DD-713EF3467603}"/>
               </a:ext>
             </a:extLst>
           </p:cNvPr>
@@ -4261,54 +4030,7 @@
         </p:nvSpPr>
         <p:spPr>
           <a:xfrm>
-            <a:off x="2292627" y="2885032"/>
-            <a:ext cx="1364974" cy="357809"/>
-          </a:xfrm>
-          <a:prstGeom prst="rect">
-            <a:avLst/>
-          </a:prstGeom>
-        </p:spPr>
-        <p:style>
-          <a:lnRef idx="2">
-            <a:schemeClr val="accent3"/>
-          </a:lnRef>
-          <a:fillRef idx="1">
-            <a:schemeClr val="lt1"/>
-          </a:fillRef>
-          <a:effectRef idx="0">
-            <a:schemeClr val="accent3"/>
-          </a:effectRef>
-          <a:fontRef idx="minor">
-            <a:schemeClr val="dk1"/>
-          </a:fontRef>
-        </p:style>
-        <p:txBody>
-          <a:bodyPr rtlCol="0" anchor="ctr"/>
-          <a:lstStyle/>
-          <a:p>
-            <a:pPr algn="ctr"/>
-            <a:r>
-              <a:rPr lang="es-MX" dirty="0"/>
-              <a:t>Ir con mamá</a:t>
-            </a:r>
-          </a:p>
-        </p:txBody>
-      </p:sp>
-      <p:sp>
-        <p:nvSpPr>
-          <p:cNvPr id="44" name="Rectángulo 43">
-            <a:extLst>
-              <a:ext uri="{FF2B5EF4-FFF2-40B4-BE49-F238E27FC236}">
-                <a16:creationId xmlns:a16="http://schemas.microsoft.com/office/drawing/2014/main" id="{4B2148B7-4201-444A-A6DD-713EF3467603}"/>
-              </a:ext>
-            </a:extLst>
-          </p:cNvPr>
-          <p:cNvSpPr/>
-          <p:nvPr/>
-        </p:nvSpPr>
-        <p:spPr>
-          <a:xfrm>
-            <a:off x="4179403" y="2885032"/>
+            <a:off x="3881643" y="3121644"/>
             <a:ext cx="1752601" cy="357809"/>
           </a:xfrm>
           <a:prstGeom prst="rect">
@@ -4351,18 +4073,22 @@
             </a:extLst>
           </p:cNvPr>
           <p:cNvCxnSpPr>
-            <a:stCxn id="33" idx="2"/>
+            <a:cxnSpLocks/>
+            <a:stCxn id="110" idx="3"/>
             <a:endCxn id="44" idx="0"/>
           </p:cNvCxnSpPr>
           <p:nvPr/>
         </p:nvCxnSpPr>
         <p:spPr>
-          <a:xfrm rot="16200000" flipH="1">
-            <a:off x="4799502" y="2628830"/>
-            <a:ext cx="200980" cy="311424"/>
-          </a:xfrm>
-          <a:prstGeom prst="bentConnector3">
-            <a:avLst/>
+          <a:xfrm flipH="1">
+            <a:off x="4757944" y="2666099"/>
+            <a:ext cx="1253573" cy="455545"/>
+          </a:xfrm>
+          <a:prstGeom prst="bentConnector4">
+            <a:avLst>
+              <a:gd name="adj1" fmla="val -18236"/>
+              <a:gd name="adj2" fmla="val 77413"/>
+            </a:avLst>
           </a:prstGeom>
           <a:ln>
             <a:solidFill>
@@ -4396,17 +4122,18 @@
             </a:extLst>
           </p:cNvPr>
           <p:cNvCxnSpPr>
-            <a:stCxn id="33" idx="2"/>
-            <a:endCxn id="40" idx="0"/>
+            <a:cxnSpLocks/>
+            <a:stCxn id="110" idx="1"/>
+            <a:endCxn id="118" idx="0"/>
           </p:cNvCxnSpPr>
           <p:nvPr/>
         </p:nvCxnSpPr>
         <p:spPr>
-          <a:xfrm rot="5400000">
-            <a:off x="3759207" y="1899959"/>
-            <a:ext cx="200980" cy="1769166"/>
-          </a:xfrm>
-          <a:prstGeom prst="bentConnector3">
+          <a:xfrm rot="10800000" flipV="1">
+            <a:off x="2339008" y="2666099"/>
+            <a:ext cx="1165364" cy="508448"/>
+          </a:xfrm>
+          <a:prstGeom prst="bentConnector2">
             <a:avLst/>
           </a:prstGeom>
           <a:ln>
@@ -4438,19 +4165,21 @@
             </a:extLst>
           </p:cNvPr>
           <p:cNvCxnSpPr>
-            <a:stCxn id="40" idx="1"/>
-            <a:endCxn id="33" idx="1"/>
+            <a:cxnSpLocks/>
+            <a:stCxn id="118" idx="1"/>
+            <a:endCxn id="110" idx="0"/>
           </p:cNvCxnSpPr>
           <p:nvPr/>
         </p:nvCxnSpPr>
         <p:spPr>
           <a:xfrm rot="10800000" flipH="1">
-            <a:off x="2292627" y="2505149"/>
-            <a:ext cx="1575352" cy="558789"/>
-          </a:xfrm>
-          <a:prstGeom prst="bentConnector3">
+            <a:off x="1085435" y="2416340"/>
+            <a:ext cx="3672510" cy="937080"/>
+          </a:xfrm>
+          <a:prstGeom prst="bentConnector4">
             <a:avLst>
-              <a:gd name="adj1" fmla="val -14511"/>
+              <a:gd name="adj1" fmla="val -6225"/>
+              <a:gd name="adj2" fmla="val 124395"/>
             </a:avLst>
           </a:prstGeom>
           <a:ln>
@@ -4474,10 +4203,10 @@
       </p:cxnSp>
       <p:sp>
         <p:nvSpPr>
-          <p:cNvPr id="26" name="Rectángulo 25">
-            <a:extLst>
-              <a:ext uri="{FF2B5EF4-FFF2-40B4-BE49-F238E27FC236}">
-                <a16:creationId xmlns:a16="http://schemas.microsoft.com/office/drawing/2014/main" id="{0CDB85E3-176A-4821-8DEF-790FF8F89A17}"/>
+          <p:cNvPr id="28" name="Rectángulo 27">
+            <a:extLst>
+              <a:ext uri="{FF2B5EF4-FFF2-40B4-BE49-F238E27FC236}">
+                <a16:creationId xmlns:a16="http://schemas.microsoft.com/office/drawing/2014/main" id="{F3C46036-8CD4-4135-BE56-BA9CC650C3D0}"/>
               </a:ext>
             </a:extLst>
           </p:cNvPr>
@@ -4486,54 +4215,7 @@
         </p:nvSpPr>
         <p:spPr>
           <a:xfrm>
-            <a:off x="2332383" y="3494144"/>
-            <a:ext cx="2650435" cy="357809"/>
-          </a:xfrm>
-          <a:prstGeom prst="rect">
-            <a:avLst/>
-          </a:prstGeom>
-        </p:spPr>
-        <p:style>
-          <a:lnRef idx="2">
-            <a:schemeClr val="accent3"/>
-          </a:lnRef>
-          <a:fillRef idx="1">
-            <a:schemeClr val="lt1"/>
-          </a:fillRef>
-          <a:effectRef idx="0">
-            <a:schemeClr val="accent3"/>
-          </a:effectRef>
-          <a:fontRef idx="minor">
-            <a:schemeClr val="dk1"/>
-          </a:fontRef>
-        </p:style>
-        <p:txBody>
-          <a:bodyPr rtlCol="0" anchor="ctr"/>
-          <a:lstStyle/>
-          <a:p>
-            <a:pPr algn="ctr"/>
-            <a:r>
-              <a:rPr lang="es-MX" dirty="0"/>
-              <a:t>Triangulo de las bermudas</a:t>
-            </a:r>
-          </a:p>
-        </p:txBody>
-      </p:sp>
-      <p:sp>
-        <p:nvSpPr>
-          <p:cNvPr id="28" name="Rectángulo 27">
-            <a:extLst>
-              <a:ext uri="{FF2B5EF4-FFF2-40B4-BE49-F238E27FC236}">
-                <a16:creationId xmlns:a16="http://schemas.microsoft.com/office/drawing/2014/main" id="{F3C46036-8CD4-4135-BE56-BA9CC650C3D0}"/>
-              </a:ext>
-            </a:extLst>
-          </p:cNvPr>
-          <p:cNvSpPr/>
-          <p:nvPr/>
-        </p:nvSpPr>
-        <p:spPr>
-          <a:xfrm>
-            <a:off x="5516220" y="3494144"/>
+            <a:off x="5548106" y="3860006"/>
             <a:ext cx="1040296" cy="357809"/>
           </a:xfrm>
           <a:prstGeom prst="rect">
@@ -4577,18 +4259,21 @@
             </a:extLst>
           </p:cNvPr>
           <p:cNvCxnSpPr>
+            <a:cxnSpLocks/>
             <a:stCxn id="44" idx="2"/>
-            <a:endCxn id="26" idx="0"/>
+            <a:endCxn id="130" idx="0"/>
           </p:cNvCxnSpPr>
           <p:nvPr/>
         </p:nvCxnSpPr>
         <p:spPr>
           <a:xfrm rot="5400000">
-            <a:off x="4231002" y="2669441"/>
-            <a:ext cx="251303" cy="1398103"/>
+            <a:off x="4106218" y="2951115"/>
+            <a:ext cx="123389" cy="1180064"/>
           </a:xfrm>
           <a:prstGeom prst="bentConnector3">
-            <a:avLst/>
+            <a:avLst>
+              <a:gd name="adj1" fmla="val 50000"/>
+            </a:avLst>
           </a:prstGeom>
           <a:ln>
             <a:solidFill>
@@ -4622,6 +4307,7 @@
             </a:extLst>
           </p:cNvPr>
           <p:cNvCxnSpPr>
+            <a:cxnSpLocks/>
             <a:stCxn id="44" idx="2"/>
             <a:endCxn id="28" idx="0"/>
           </p:cNvCxnSpPr>
@@ -4629,8 +4315,8 @@
         </p:nvCxnSpPr>
         <p:spPr>
           <a:xfrm rot="16200000" flipH="1">
-            <a:off x="5420385" y="2878160"/>
-            <a:ext cx="251303" cy="980664"/>
+            <a:off x="5222823" y="3014574"/>
+            <a:ext cx="380553" cy="1310310"/>
           </a:xfrm>
           <a:prstGeom prst="bentConnector3">
             <a:avLst/>
@@ -4668,8 +4354,8 @@
         </p:nvSpPr>
         <p:spPr>
           <a:xfrm>
-            <a:off x="331304" y="4103253"/>
-            <a:ext cx="3175553" cy="357809"/>
+            <a:off x="331305" y="4396192"/>
+            <a:ext cx="2507146" cy="537710"/>
           </a:xfrm>
           <a:prstGeom prst="rect">
             <a:avLst/>
@@ -4697,53 +4383,6 @@
             <a:r>
               <a:rPr lang="es-MX" dirty="0"/>
               <a:t>Tirar el té sobre la computadora</a:t>
-            </a:r>
-          </a:p>
-        </p:txBody>
-      </p:sp>
-      <p:sp>
-        <p:nvSpPr>
-          <p:cNvPr id="31" name="Rectángulo 30">
-            <a:extLst>
-              <a:ext uri="{FF2B5EF4-FFF2-40B4-BE49-F238E27FC236}">
-                <a16:creationId xmlns:a16="http://schemas.microsoft.com/office/drawing/2014/main" id="{CD0E0D69-BF89-4160-9874-E61E4DEC6DF3}"/>
-              </a:ext>
-            </a:extLst>
-          </p:cNvPr>
-          <p:cNvSpPr/>
-          <p:nvPr/>
-        </p:nvSpPr>
-        <p:spPr>
-          <a:xfrm>
-            <a:off x="3688250" y="4103252"/>
-            <a:ext cx="1570382" cy="357809"/>
-          </a:xfrm>
-          <a:prstGeom prst="rect">
-            <a:avLst/>
-          </a:prstGeom>
-        </p:spPr>
-        <p:style>
-          <a:lnRef idx="2">
-            <a:schemeClr val="accent3"/>
-          </a:lnRef>
-          <a:fillRef idx="1">
-            <a:schemeClr val="lt1"/>
-          </a:fillRef>
-          <a:effectRef idx="0">
-            <a:schemeClr val="accent3"/>
-          </a:effectRef>
-          <a:fontRef idx="minor">
-            <a:schemeClr val="dk1"/>
-          </a:fontRef>
-        </p:style>
-        <p:txBody>
-          <a:bodyPr rtlCol="0" anchor="ctr"/>
-          <a:lstStyle/>
-          <a:p>
-            <a:pPr algn="ctr"/>
-            <a:r>
-              <a:rPr lang="es-MX" dirty="0"/>
-              <a:t>Gritarle a papá</a:t>
             </a:r>
           </a:p>
         </p:txBody>
@@ -4758,15 +4397,16 @@
             </a:extLst>
           </p:cNvPr>
           <p:cNvCxnSpPr>
-            <a:stCxn id="26" idx="2"/>
+            <a:cxnSpLocks/>
+            <a:stCxn id="130" idx="2"/>
             <a:endCxn id="30" idx="0"/>
           </p:cNvCxnSpPr>
           <p:nvPr/>
         </p:nvCxnSpPr>
         <p:spPr>
           <a:xfrm rot="5400000">
-            <a:off x="2662691" y="3108343"/>
-            <a:ext cx="251300" cy="1738520"/>
+            <a:off x="2456907" y="3275219"/>
+            <a:ext cx="248944" cy="1993002"/>
           </a:xfrm>
           <a:prstGeom prst="bentConnector3">
             <a:avLst/>
@@ -4800,18 +4440,22 @@
             </a:extLst>
           </p:cNvPr>
           <p:cNvCxnSpPr>
-            <a:stCxn id="26" idx="2"/>
-            <a:endCxn id="31" idx="0"/>
+            <a:cxnSpLocks/>
+            <a:stCxn id="130" idx="3"/>
+            <a:endCxn id="148" idx="0"/>
           </p:cNvCxnSpPr>
           <p:nvPr/>
         </p:nvCxnSpPr>
         <p:spPr>
-          <a:xfrm rot="16200000" flipH="1">
-            <a:off x="3939872" y="3569682"/>
-            <a:ext cx="251299" cy="815840"/>
-          </a:xfrm>
-          <a:prstGeom prst="bentConnector3">
-            <a:avLst/>
+          <a:xfrm flipH="1">
+            <a:off x="4497248" y="3875045"/>
+            <a:ext cx="571709" cy="543671"/>
+          </a:xfrm>
+          <a:prstGeom prst="bentConnector4">
+            <a:avLst>
+              <a:gd name="adj1" fmla="val -39985"/>
+              <a:gd name="adj2" fmla="val 75034"/>
+            </a:avLst>
           </a:prstGeom>
           <a:ln>
             <a:solidFill>
@@ -4845,19 +4489,20 @@
             </a:extLst>
           </p:cNvPr>
           <p:cNvCxnSpPr>
+            <a:cxnSpLocks/>
             <a:stCxn id="30" idx="1"/>
-            <a:endCxn id="26" idx="1"/>
+            <a:endCxn id="130" idx="1"/>
           </p:cNvCxnSpPr>
           <p:nvPr/>
         </p:nvCxnSpPr>
         <p:spPr>
           <a:xfrm rot="10800000" flipH="1">
-            <a:off x="331303" y="3673050"/>
-            <a:ext cx="2001079" cy="609109"/>
+            <a:off x="331305" y="3875045"/>
+            <a:ext cx="1755498" cy="790002"/>
           </a:xfrm>
           <a:prstGeom prst="bentConnector3">
             <a:avLst>
-              <a:gd name="adj1" fmla="val -11424"/>
+              <a:gd name="adj1" fmla="val -13022"/>
             </a:avLst>
           </a:prstGeom>
           <a:ln>
@@ -4893,7 +4538,7 @@
         </p:nvSpPr>
         <p:spPr>
           <a:xfrm>
-            <a:off x="2292626" y="4712359"/>
+            <a:off x="2107093" y="5032344"/>
             <a:ext cx="1860689" cy="357809"/>
           </a:xfrm>
           <a:prstGeom prst="rect">
@@ -4922,53 +4567,6 @@
             <a:r>
               <a:rPr lang="es-MX" dirty="0"/>
               <a:t>Ir con la psicóloga</a:t>
-            </a:r>
-          </a:p>
-        </p:txBody>
-      </p:sp>
-      <p:sp>
-        <p:nvSpPr>
-          <p:cNvPr id="42" name="Rectángulo 41">
-            <a:extLst>
-              <a:ext uri="{FF2B5EF4-FFF2-40B4-BE49-F238E27FC236}">
-                <a16:creationId xmlns:a16="http://schemas.microsoft.com/office/drawing/2014/main" id="{D354A9E8-CB0C-4003-A83A-BC73468096C6}"/>
-              </a:ext>
-            </a:extLst>
-          </p:cNvPr>
-          <p:cNvSpPr/>
-          <p:nvPr/>
-        </p:nvSpPr>
-        <p:spPr>
-          <a:xfrm>
-            <a:off x="4473441" y="4712359"/>
-            <a:ext cx="1458564" cy="357809"/>
-          </a:xfrm>
-          <a:prstGeom prst="rect">
-            <a:avLst/>
-          </a:prstGeom>
-        </p:spPr>
-        <p:style>
-          <a:lnRef idx="2">
-            <a:schemeClr val="accent3"/>
-          </a:lnRef>
-          <a:fillRef idx="1">
-            <a:schemeClr val="lt1"/>
-          </a:fillRef>
-          <a:effectRef idx="0">
-            <a:schemeClr val="accent3"/>
-          </a:effectRef>
-          <a:fontRef idx="minor">
-            <a:schemeClr val="dk1"/>
-          </a:fontRef>
-        </p:style>
-        <p:txBody>
-          <a:bodyPr rtlCol="0" anchor="ctr"/>
-          <a:lstStyle/>
-          <a:p>
-            <a:pPr algn="ctr"/>
-            <a:r>
-              <a:rPr lang="es-MX" dirty="0"/>
-              <a:t>Seguir a Colin</a:t>
             </a:r>
           </a:p>
         </p:txBody>
@@ -4983,17 +4581,18 @@
             </a:extLst>
           </p:cNvPr>
           <p:cNvCxnSpPr>
-            <a:stCxn id="31" idx="2"/>
+            <a:cxnSpLocks/>
+            <a:stCxn id="148" idx="1"/>
             <a:endCxn id="41" idx="0"/>
           </p:cNvCxnSpPr>
           <p:nvPr/>
         </p:nvCxnSpPr>
         <p:spPr>
-          <a:xfrm rot="5400000">
-            <a:off x="3722557" y="3961475"/>
-            <a:ext cx="251298" cy="1250470"/>
-          </a:xfrm>
-          <a:prstGeom prst="bentConnector3">
+          <a:xfrm rot="10800000" flipV="1">
+            <a:off x="3037439" y="4690918"/>
+            <a:ext cx="376237" cy="341425"/>
+          </a:xfrm>
+          <a:prstGeom prst="bentConnector2">
             <a:avLst/>
           </a:prstGeom>
           <a:ln>
@@ -5025,17 +4624,18 @@
             </a:extLst>
           </p:cNvPr>
           <p:cNvCxnSpPr>
-            <a:stCxn id="31" idx="2"/>
-            <a:endCxn id="42" idx="0"/>
+            <a:cxnSpLocks/>
+            <a:stCxn id="148" idx="3"/>
+            <a:endCxn id="155" idx="0"/>
           </p:cNvCxnSpPr>
           <p:nvPr/>
         </p:nvCxnSpPr>
         <p:spPr>
-          <a:xfrm rot="16200000" flipH="1">
-            <a:off x="4712433" y="4222069"/>
-            <a:ext cx="251298" cy="729282"/>
-          </a:xfrm>
-          <a:prstGeom prst="bentConnector3">
+          <a:xfrm>
+            <a:off x="5580821" y="4690919"/>
+            <a:ext cx="1891958" cy="116228"/>
+          </a:xfrm>
+          <a:prstGeom prst="bentConnector2">
             <a:avLst/>
           </a:prstGeom>
           <a:ln>
@@ -5070,19 +4670,20 @@
             </a:extLst>
           </p:cNvPr>
           <p:cNvCxnSpPr>
-            <a:stCxn id="24" idx="1"/>
-            <a:endCxn id="16" idx="1"/>
+            <a:cxnSpLocks/>
+            <a:stCxn id="65" idx="1"/>
+            <a:endCxn id="53" idx="1"/>
           </p:cNvCxnSpPr>
           <p:nvPr/>
         </p:nvCxnSpPr>
         <p:spPr>
           <a:xfrm rot="10800000" flipH="1">
-            <a:off x="2835964" y="1310498"/>
-            <a:ext cx="1842053" cy="644198"/>
+            <a:off x="1784481" y="1286778"/>
+            <a:ext cx="2272337" cy="616479"/>
           </a:xfrm>
           <a:prstGeom prst="bentConnector3">
             <a:avLst>
-              <a:gd name="adj1" fmla="val -12410"/>
+              <a:gd name="adj1" fmla="val -10060"/>
             </a:avLst>
           </a:prstGeom>
           <a:ln>
@@ -5106,10 +4707,10 @@
       </p:cxnSp>
       <p:sp>
         <p:nvSpPr>
-          <p:cNvPr id="49" name="Rectángulo 48">
-            <a:extLst>
-              <a:ext uri="{FF2B5EF4-FFF2-40B4-BE49-F238E27FC236}">
-                <a16:creationId xmlns:a16="http://schemas.microsoft.com/office/drawing/2014/main" id="{781D196A-996C-47BC-8E69-DAE49945846C}"/>
+          <p:cNvPr id="51" name="Rectángulo 50">
+            <a:extLst>
+              <a:ext uri="{FF2B5EF4-FFF2-40B4-BE49-F238E27FC236}">
+                <a16:creationId xmlns:a16="http://schemas.microsoft.com/office/drawing/2014/main" id="{C1B4309F-F14A-48BE-8703-1104EC9AB648}"/>
               </a:ext>
             </a:extLst>
           </p:cNvPr>
@@ -5118,54 +4719,7 @@
         </p:nvSpPr>
         <p:spPr>
           <a:xfrm>
-            <a:off x="3541644" y="5321465"/>
-            <a:ext cx="1202635" cy="357809"/>
-          </a:xfrm>
-          <a:prstGeom prst="rect">
-            <a:avLst/>
-          </a:prstGeom>
-        </p:spPr>
-        <p:style>
-          <a:lnRef idx="2">
-            <a:schemeClr val="accent3"/>
-          </a:lnRef>
-          <a:fillRef idx="1">
-            <a:schemeClr val="lt1"/>
-          </a:fillRef>
-          <a:effectRef idx="0">
-            <a:schemeClr val="accent3"/>
-          </a:effectRef>
-          <a:fontRef idx="minor">
-            <a:schemeClr val="dk1"/>
-          </a:fontRef>
-        </p:style>
-        <p:txBody>
-          <a:bodyPr rtlCol="0" anchor="ctr"/>
-          <a:lstStyle/>
-          <a:p>
-            <a:pPr algn="ctr"/>
-            <a:r>
-              <a:rPr lang="es-MX" dirty="0"/>
-              <a:t>Tomar LSD</a:t>
-            </a:r>
-          </a:p>
-        </p:txBody>
-      </p:sp>
-      <p:sp>
-        <p:nvSpPr>
-          <p:cNvPr id="51" name="Rectángulo 50">
-            <a:extLst>
-              <a:ext uri="{FF2B5EF4-FFF2-40B4-BE49-F238E27FC236}">
-                <a16:creationId xmlns:a16="http://schemas.microsoft.com/office/drawing/2014/main" id="{C1B4309F-F14A-48BE-8703-1104EC9AB648}"/>
-              </a:ext>
-            </a:extLst>
-          </p:cNvPr>
-          <p:cNvSpPr/>
-          <p:nvPr/>
-        </p:nvSpPr>
-        <p:spPr>
-          <a:xfrm>
-            <a:off x="5258631" y="5321464"/>
+            <a:off x="8001419" y="5583559"/>
             <a:ext cx="1552985" cy="357809"/>
           </a:xfrm>
           <a:prstGeom prst="rect">
@@ -5208,17 +4762,18 @@
             </a:extLst>
           </p:cNvPr>
           <p:cNvCxnSpPr>
-            <a:stCxn id="42" idx="2"/>
-            <a:endCxn id="49" idx="0"/>
+            <a:cxnSpLocks/>
+            <a:stCxn id="155" idx="1"/>
+            <a:endCxn id="161" idx="0"/>
           </p:cNvCxnSpPr>
           <p:nvPr/>
         </p:nvCxnSpPr>
         <p:spPr>
-          <a:xfrm rot="5400000">
-            <a:off x="4547195" y="4665936"/>
-            <a:ext cx="251297" cy="1059761"/>
-          </a:xfrm>
-          <a:prstGeom prst="bentConnector3">
+          <a:xfrm rot="10800000" flipV="1">
+            <a:off x="4878250" y="5079349"/>
+            <a:ext cx="1510956" cy="197763"/>
+          </a:xfrm>
+          <a:prstGeom prst="bentConnector2">
             <a:avLst/>
           </a:prstGeom>
           <a:ln>
@@ -5253,17 +4808,18 @@
             </a:extLst>
           </p:cNvPr>
           <p:cNvCxnSpPr>
-            <a:stCxn id="42" idx="2"/>
+            <a:cxnSpLocks/>
+            <a:stCxn id="155" idx="3"/>
             <a:endCxn id="51" idx="0"/>
           </p:cNvCxnSpPr>
           <p:nvPr/>
         </p:nvCxnSpPr>
         <p:spPr>
-          <a:xfrm rot="16200000" flipH="1">
-            <a:off x="5493275" y="4779615"/>
-            <a:ext cx="251296" cy="832401"/>
-          </a:xfrm>
-          <a:prstGeom prst="bentConnector3">
+          <a:xfrm>
+            <a:off x="8556352" y="5079350"/>
+            <a:ext cx="221560" cy="504209"/>
+          </a:xfrm>
+          <a:prstGeom prst="bentConnector2">
             <a:avLst/>
           </a:prstGeom>
           <a:ln>
@@ -5299,7 +4855,7 @@
         </p:nvSpPr>
         <p:spPr>
           <a:xfrm>
-            <a:off x="2859157" y="5930571"/>
+            <a:off x="2889802" y="5941368"/>
             <a:ext cx="1202635" cy="357809"/>
           </a:xfrm>
           <a:prstGeom prst="rect">
@@ -5346,7 +4902,7 @@
         </p:nvSpPr>
         <p:spPr>
           <a:xfrm>
-            <a:off x="4389783" y="5930569"/>
+            <a:off x="5678144" y="6239001"/>
             <a:ext cx="1364974" cy="357809"/>
           </a:xfrm>
           <a:prstGeom prst="rect">
@@ -5389,17 +4945,18 @@
             </a:extLst>
           </p:cNvPr>
           <p:cNvCxnSpPr>
-            <a:stCxn id="49" idx="2"/>
+            <a:cxnSpLocks/>
+            <a:stCxn id="161" idx="1"/>
             <a:endCxn id="59" idx="0"/>
           </p:cNvCxnSpPr>
           <p:nvPr/>
         </p:nvCxnSpPr>
         <p:spPr>
-          <a:xfrm rot="5400000">
-            <a:off x="3676071" y="5463679"/>
-            <a:ext cx="251297" cy="682487"/>
-          </a:xfrm>
-          <a:prstGeom prst="bentConnector3">
+          <a:xfrm rot="10800000" flipV="1">
+            <a:off x="3491120" y="5549316"/>
+            <a:ext cx="476662" cy="392052"/>
+          </a:xfrm>
+          <a:prstGeom prst="bentConnector2">
             <a:avLst/>
           </a:prstGeom>
           <a:ln>
@@ -5434,17 +4991,18 @@
             </a:extLst>
           </p:cNvPr>
           <p:cNvCxnSpPr>
-            <a:stCxn id="49" idx="2"/>
+            <a:cxnSpLocks/>
+            <a:stCxn id="161" idx="3"/>
             <a:endCxn id="60" idx="0"/>
           </p:cNvCxnSpPr>
           <p:nvPr/>
         </p:nvCxnSpPr>
         <p:spPr>
-          <a:xfrm rot="16200000" flipH="1">
-            <a:off x="4481969" y="5340267"/>
-            <a:ext cx="251295" cy="929308"/>
-          </a:xfrm>
-          <a:prstGeom prst="bentConnector3">
+          <a:xfrm>
+            <a:off x="5788718" y="5549316"/>
+            <a:ext cx="571913" cy="689685"/>
+          </a:xfrm>
+          <a:prstGeom prst="bentConnector2">
             <a:avLst/>
           </a:prstGeom>
           <a:ln>
@@ -5482,7 +5040,7 @@
         </p:nvCxnSpPr>
         <p:spPr>
           <a:xfrm rot="16200000" flipH="1">
-            <a:off x="3815911" y="5932944"/>
+            <a:off x="3846556" y="5943741"/>
             <a:ext cx="218437" cy="929308"/>
           </a:xfrm>
           <a:prstGeom prst="bentConnector2">
@@ -5551,6 +5109,482 @@
           </a:fontRef>
         </p:style>
       </p:cxnSp>
+      <p:sp>
+        <p:nvSpPr>
+          <p:cNvPr id="2" name="Diagrama de flujo: decisión 1">
+            <a:extLst>
+              <a:ext uri="{FF2B5EF4-FFF2-40B4-BE49-F238E27FC236}">
+                <a16:creationId xmlns:a16="http://schemas.microsoft.com/office/drawing/2014/main" id="{E4BB2B40-2588-4E28-A7CE-F5FC0786D33C}"/>
+              </a:ext>
+            </a:extLst>
+          </p:cNvPr>
+          <p:cNvSpPr/>
+          <p:nvPr/>
+        </p:nvSpPr>
+        <p:spPr>
+          <a:xfrm>
+            <a:off x="6506817" y="529015"/>
+            <a:ext cx="1706219" cy="499517"/>
+          </a:xfrm>
+          <a:prstGeom prst="flowChartDecision">
+            <a:avLst/>
+          </a:prstGeom>
+        </p:spPr>
+        <p:style>
+          <a:lnRef idx="2">
+            <a:schemeClr val="accent3"/>
+          </a:lnRef>
+          <a:fillRef idx="1">
+            <a:schemeClr val="lt1"/>
+          </a:fillRef>
+          <a:effectRef idx="0">
+            <a:schemeClr val="accent3"/>
+          </a:effectRef>
+          <a:fontRef idx="minor">
+            <a:schemeClr val="dk1"/>
+          </a:fontRef>
+        </p:style>
+        <p:txBody>
+          <a:bodyPr rtlCol="0" anchor="ctr"/>
+          <a:lstStyle/>
+          <a:p>
+            <a:pPr algn="ctr"/>
+            <a:r>
+              <a:rPr lang="es-MX" sz="1600" dirty="0" err="1"/>
+              <a:t>Frosties</a:t>
+            </a:r>
+            <a:endParaRPr lang="es-MX" sz="1600" dirty="0"/>
+          </a:p>
+        </p:txBody>
+      </p:sp>
+      <p:sp>
+        <p:nvSpPr>
+          <p:cNvPr id="53" name="Diagrama de flujo: decisión 52">
+            <a:extLst>
+              <a:ext uri="{FF2B5EF4-FFF2-40B4-BE49-F238E27FC236}">
+                <a16:creationId xmlns:a16="http://schemas.microsoft.com/office/drawing/2014/main" id="{73918A02-D913-4BE3-93EA-FE99E0C13E92}"/>
+              </a:ext>
+            </a:extLst>
+          </p:cNvPr>
+          <p:cNvSpPr/>
+          <p:nvPr/>
+        </p:nvSpPr>
+        <p:spPr>
+          <a:xfrm>
+            <a:off x="4056819" y="1037018"/>
+            <a:ext cx="2332387" cy="499517"/>
+          </a:xfrm>
+          <a:prstGeom prst="flowChartDecision">
+            <a:avLst/>
+          </a:prstGeom>
+        </p:spPr>
+        <p:style>
+          <a:lnRef idx="2">
+            <a:schemeClr val="accent3"/>
+          </a:lnRef>
+          <a:fillRef idx="1">
+            <a:schemeClr val="lt1"/>
+          </a:fillRef>
+          <a:effectRef idx="0">
+            <a:schemeClr val="accent3"/>
+          </a:effectRef>
+          <a:fontRef idx="minor">
+            <a:schemeClr val="dk1"/>
+          </a:fontRef>
+        </p:style>
+        <p:txBody>
+          <a:bodyPr rtlCol="0" anchor="ctr"/>
+          <a:lstStyle/>
+          <a:p>
+            <a:pPr algn="ctr"/>
+            <a:r>
+              <a:rPr lang="es-MX" sz="1600" dirty="0"/>
+              <a:t>Thompson </a:t>
+            </a:r>
+            <a:r>
+              <a:rPr lang="es-MX" sz="1600" dirty="0" err="1"/>
+              <a:t>Twins</a:t>
+            </a:r>
+            <a:endParaRPr lang="es-MX" sz="1600" dirty="0"/>
+          </a:p>
+        </p:txBody>
+      </p:sp>
+      <p:sp>
+        <p:nvSpPr>
+          <p:cNvPr id="65" name="Diagrama de flujo: decisión 64">
+            <a:extLst>
+              <a:ext uri="{FF2B5EF4-FFF2-40B4-BE49-F238E27FC236}">
+                <a16:creationId xmlns:a16="http://schemas.microsoft.com/office/drawing/2014/main" id="{274107CD-3ACD-4575-A85B-4299896EB488}"/>
+              </a:ext>
+            </a:extLst>
+          </p:cNvPr>
+          <p:cNvSpPr/>
+          <p:nvPr/>
+        </p:nvSpPr>
+        <p:spPr>
+          <a:xfrm>
+            <a:off x="1784482" y="1653497"/>
+            <a:ext cx="2332387" cy="499517"/>
+          </a:xfrm>
+          <a:prstGeom prst="flowChartDecision">
+            <a:avLst/>
+          </a:prstGeom>
+        </p:spPr>
+        <p:style>
+          <a:lnRef idx="2">
+            <a:schemeClr val="accent3"/>
+          </a:lnRef>
+          <a:fillRef idx="1">
+            <a:schemeClr val="lt1"/>
+          </a:fillRef>
+          <a:effectRef idx="0">
+            <a:schemeClr val="accent3"/>
+          </a:effectRef>
+          <a:fontRef idx="minor">
+            <a:schemeClr val="dk1"/>
+          </a:fontRef>
+        </p:style>
+        <p:txBody>
+          <a:bodyPr rtlCol="0" anchor="ctr"/>
+          <a:lstStyle/>
+          <a:p>
+            <a:pPr algn="ctr"/>
+            <a:r>
+              <a:rPr lang="es-MX" sz="1600" dirty="0"/>
+              <a:t>Aceptar propuesta</a:t>
+            </a:r>
+          </a:p>
+        </p:txBody>
+      </p:sp>
+      <p:sp>
+        <p:nvSpPr>
+          <p:cNvPr id="94" name="Diagrama de flujo: decisión 93">
+            <a:extLst>
+              <a:ext uri="{FF2B5EF4-FFF2-40B4-BE49-F238E27FC236}">
+                <a16:creationId xmlns:a16="http://schemas.microsoft.com/office/drawing/2014/main" id="{610A4A7D-CA58-4ECE-9D66-5E1628253658}"/>
+              </a:ext>
+            </a:extLst>
+          </p:cNvPr>
+          <p:cNvSpPr/>
+          <p:nvPr/>
+        </p:nvSpPr>
+        <p:spPr>
+          <a:xfrm>
+            <a:off x="4776165" y="1702343"/>
+            <a:ext cx="2507145" cy="499517"/>
+          </a:xfrm>
+          <a:prstGeom prst="flowChartDecision">
+            <a:avLst/>
+          </a:prstGeom>
+        </p:spPr>
+        <p:style>
+          <a:lnRef idx="2">
+            <a:schemeClr val="accent3"/>
+          </a:lnRef>
+          <a:fillRef idx="1">
+            <a:schemeClr val="lt1"/>
+          </a:fillRef>
+          <a:effectRef idx="0">
+            <a:schemeClr val="accent3"/>
+          </a:effectRef>
+          <a:fontRef idx="minor">
+            <a:schemeClr val="dk1"/>
+          </a:fontRef>
+        </p:style>
+        <p:txBody>
+          <a:bodyPr rtlCol="0" anchor="ctr"/>
+          <a:lstStyle/>
+          <a:p>
+            <a:pPr algn="ctr"/>
+            <a:r>
+              <a:rPr lang="es-MX" sz="1600" dirty="0"/>
+              <a:t>Rechazar propuesta</a:t>
+            </a:r>
+          </a:p>
+        </p:txBody>
+      </p:sp>
+      <p:sp>
+        <p:nvSpPr>
+          <p:cNvPr id="110" name="Diagrama de flujo: decisión 109">
+            <a:extLst>
+              <a:ext uri="{FF2B5EF4-FFF2-40B4-BE49-F238E27FC236}">
+                <a16:creationId xmlns:a16="http://schemas.microsoft.com/office/drawing/2014/main" id="{B664D950-D31B-44A0-9173-F4423602F781}"/>
+              </a:ext>
+            </a:extLst>
+          </p:cNvPr>
+          <p:cNvSpPr/>
+          <p:nvPr/>
+        </p:nvSpPr>
+        <p:spPr>
+          <a:xfrm>
+            <a:off x="3504372" y="2416340"/>
+            <a:ext cx="2507145" cy="499517"/>
+          </a:xfrm>
+          <a:prstGeom prst="flowChartDecision">
+            <a:avLst/>
+          </a:prstGeom>
+        </p:spPr>
+        <p:style>
+          <a:lnRef idx="2">
+            <a:schemeClr val="accent3"/>
+          </a:lnRef>
+          <a:fillRef idx="1">
+            <a:schemeClr val="lt1"/>
+          </a:fillRef>
+          <a:effectRef idx="0">
+            <a:schemeClr val="accent3"/>
+          </a:effectRef>
+          <a:fontRef idx="minor">
+            <a:schemeClr val="dk1"/>
+          </a:fontRef>
+        </p:style>
+        <p:txBody>
+          <a:bodyPr rtlCol="0" anchor="ctr"/>
+          <a:lstStyle/>
+          <a:p>
+            <a:pPr algn="ctr"/>
+            <a:r>
+              <a:rPr lang="es-MX" sz="1600" dirty="0"/>
+              <a:t>Hablar de mamá</a:t>
+            </a:r>
+          </a:p>
+        </p:txBody>
+      </p:sp>
+      <p:sp>
+        <p:nvSpPr>
+          <p:cNvPr id="118" name="Diagrama de flujo: decisión 117">
+            <a:extLst>
+              <a:ext uri="{FF2B5EF4-FFF2-40B4-BE49-F238E27FC236}">
+                <a16:creationId xmlns:a16="http://schemas.microsoft.com/office/drawing/2014/main" id="{07F1B874-FD3F-4697-BB00-0E92392A922F}"/>
+              </a:ext>
+            </a:extLst>
+          </p:cNvPr>
+          <p:cNvSpPr/>
+          <p:nvPr/>
+        </p:nvSpPr>
+        <p:spPr>
+          <a:xfrm>
+            <a:off x="1085435" y="3174547"/>
+            <a:ext cx="2507145" cy="357746"/>
+          </a:xfrm>
+          <a:prstGeom prst="flowChartDecision">
+            <a:avLst/>
+          </a:prstGeom>
+        </p:spPr>
+        <p:style>
+          <a:lnRef idx="2">
+            <a:schemeClr val="accent3"/>
+          </a:lnRef>
+          <a:fillRef idx="1">
+            <a:schemeClr val="lt1"/>
+          </a:fillRef>
+          <a:effectRef idx="0">
+            <a:schemeClr val="accent3"/>
+          </a:effectRef>
+          <a:fontRef idx="minor">
+            <a:schemeClr val="dk1"/>
+          </a:fontRef>
+        </p:style>
+        <p:txBody>
+          <a:bodyPr rtlCol="0" anchor="ctr"/>
+          <a:lstStyle/>
+          <a:p>
+            <a:pPr algn="ctr"/>
+            <a:r>
+              <a:rPr lang="es-MX" sz="1600" dirty="0"/>
+              <a:t>Ir con mamá</a:t>
+            </a:r>
+          </a:p>
+        </p:txBody>
+      </p:sp>
+      <p:sp>
+        <p:nvSpPr>
+          <p:cNvPr id="130" name="Diagrama de flujo: decisión 129">
+            <a:extLst>
+              <a:ext uri="{FF2B5EF4-FFF2-40B4-BE49-F238E27FC236}">
+                <a16:creationId xmlns:a16="http://schemas.microsoft.com/office/drawing/2014/main" id="{4D185848-5F72-434A-BE04-8F5F9AC17683}"/>
+              </a:ext>
+            </a:extLst>
+          </p:cNvPr>
+          <p:cNvSpPr/>
+          <p:nvPr/>
+        </p:nvSpPr>
+        <p:spPr>
+          <a:xfrm>
+            <a:off x="2086803" y="3602842"/>
+            <a:ext cx="2982154" cy="544406"/>
+          </a:xfrm>
+          <a:prstGeom prst="flowChartDecision">
+            <a:avLst/>
+          </a:prstGeom>
+        </p:spPr>
+        <p:style>
+          <a:lnRef idx="2">
+            <a:schemeClr val="accent3"/>
+          </a:lnRef>
+          <a:fillRef idx="1">
+            <a:schemeClr val="lt1"/>
+          </a:fillRef>
+          <a:effectRef idx="0">
+            <a:schemeClr val="accent3"/>
+          </a:effectRef>
+          <a:fontRef idx="minor">
+            <a:schemeClr val="dk1"/>
+          </a:fontRef>
+        </p:style>
+        <p:txBody>
+          <a:bodyPr rtlCol="0" anchor="ctr"/>
+          <a:lstStyle/>
+          <a:p>
+            <a:pPr algn="ctr"/>
+            <a:r>
+              <a:rPr lang="es-MX" sz="1600" dirty="0"/>
+              <a:t>Triangulo de las bermudas</a:t>
+            </a:r>
+          </a:p>
+        </p:txBody>
+      </p:sp>
+      <p:sp>
+        <p:nvSpPr>
+          <p:cNvPr id="148" name="Diagrama de flujo: decisión 147">
+            <a:extLst>
+              <a:ext uri="{FF2B5EF4-FFF2-40B4-BE49-F238E27FC236}">
+                <a16:creationId xmlns:a16="http://schemas.microsoft.com/office/drawing/2014/main" id="{2CF3F126-155C-4C90-9884-C8658A53F5D1}"/>
+              </a:ext>
+            </a:extLst>
+          </p:cNvPr>
+          <p:cNvSpPr/>
+          <p:nvPr/>
+        </p:nvSpPr>
+        <p:spPr>
+          <a:xfrm>
+            <a:off x="3413675" y="4418716"/>
+            <a:ext cx="2167146" cy="544406"/>
+          </a:xfrm>
+          <a:prstGeom prst="flowChartDecision">
+            <a:avLst/>
+          </a:prstGeom>
+        </p:spPr>
+        <p:style>
+          <a:lnRef idx="2">
+            <a:schemeClr val="accent3"/>
+          </a:lnRef>
+          <a:fillRef idx="1">
+            <a:schemeClr val="lt1"/>
+          </a:fillRef>
+          <a:effectRef idx="0">
+            <a:schemeClr val="accent3"/>
+          </a:effectRef>
+          <a:fontRef idx="minor">
+            <a:schemeClr val="dk1"/>
+          </a:fontRef>
+        </p:style>
+        <p:txBody>
+          <a:bodyPr rtlCol="0" anchor="ctr"/>
+          <a:lstStyle/>
+          <a:p>
+            <a:pPr algn="ctr"/>
+            <a:r>
+              <a:rPr lang="es-MX" sz="1600" dirty="0"/>
+              <a:t>Gritarle a papá</a:t>
+            </a:r>
+          </a:p>
+        </p:txBody>
+      </p:sp>
+      <p:sp>
+        <p:nvSpPr>
+          <p:cNvPr id="155" name="Diagrama de flujo: decisión 154">
+            <a:extLst>
+              <a:ext uri="{FF2B5EF4-FFF2-40B4-BE49-F238E27FC236}">
+                <a16:creationId xmlns:a16="http://schemas.microsoft.com/office/drawing/2014/main" id="{7AEF07F4-DA53-4217-B602-730C150ACBCE}"/>
+              </a:ext>
+            </a:extLst>
+          </p:cNvPr>
+          <p:cNvSpPr/>
+          <p:nvPr/>
+        </p:nvSpPr>
+        <p:spPr>
+          <a:xfrm>
+            <a:off x="6389206" y="4807147"/>
+            <a:ext cx="2167146" cy="544406"/>
+          </a:xfrm>
+          <a:prstGeom prst="flowChartDecision">
+            <a:avLst/>
+          </a:prstGeom>
+        </p:spPr>
+        <p:style>
+          <a:lnRef idx="2">
+            <a:schemeClr val="accent3"/>
+          </a:lnRef>
+          <a:fillRef idx="1">
+            <a:schemeClr val="lt1"/>
+          </a:fillRef>
+          <a:effectRef idx="0">
+            <a:schemeClr val="accent3"/>
+          </a:effectRef>
+          <a:fontRef idx="minor">
+            <a:schemeClr val="dk1"/>
+          </a:fontRef>
+        </p:style>
+        <p:txBody>
+          <a:bodyPr rtlCol="0" anchor="ctr"/>
+          <a:lstStyle/>
+          <a:p>
+            <a:pPr algn="ctr"/>
+            <a:r>
+              <a:rPr lang="es-MX" sz="1600" dirty="0"/>
+              <a:t>Seguir a Colin</a:t>
+            </a:r>
+          </a:p>
+        </p:txBody>
+      </p:sp>
+      <p:sp>
+        <p:nvSpPr>
+          <p:cNvPr id="161" name="Diagrama de flujo: decisión 160">
+            <a:extLst>
+              <a:ext uri="{FF2B5EF4-FFF2-40B4-BE49-F238E27FC236}">
+                <a16:creationId xmlns:a16="http://schemas.microsoft.com/office/drawing/2014/main" id="{6965EA59-390E-45A6-A4B3-C7B12774A937}"/>
+              </a:ext>
+            </a:extLst>
+          </p:cNvPr>
+          <p:cNvSpPr/>
+          <p:nvPr/>
+        </p:nvSpPr>
+        <p:spPr>
+          <a:xfrm>
+            <a:off x="3967782" y="5277113"/>
+            <a:ext cx="1820936" cy="544406"/>
+          </a:xfrm>
+          <a:prstGeom prst="flowChartDecision">
+            <a:avLst/>
+          </a:prstGeom>
+        </p:spPr>
+        <p:style>
+          <a:lnRef idx="2">
+            <a:schemeClr val="accent3"/>
+          </a:lnRef>
+          <a:fillRef idx="1">
+            <a:schemeClr val="lt1"/>
+          </a:fillRef>
+          <a:effectRef idx="0">
+            <a:schemeClr val="accent3"/>
+          </a:effectRef>
+          <a:fontRef idx="minor">
+            <a:schemeClr val="dk1"/>
+          </a:fontRef>
+        </p:style>
+        <p:txBody>
+          <a:bodyPr rtlCol="0" anchor="ctr"/>
+          <a:lstStyle/>
+          <a:p>
+            <a:pPr algn="ctr"/>
+            <a:r>
+              <a:rPr lang="es-MX" sz="1600" dirty="0"/>
+              <a:t>Tomar LSD</a:t>
+            </a:r>
+          </a:p>
+        </p:txBody>
+      </p:sp>
     </p:spTree>
     <p:extLst>
       <p:ext uri="{BB962C8B-B14F-4D97-AF65-F5344CB8AC3E}">
@@ -5595,7 +5629,7 @@
         </p:nvSpPr>
         <p:spPr>
           <a:xfrm>
-            <a:off x="2928730" y="503583"/>
+            <a:off x="2922102" y="185499"/>
             <a:ext cx="1855305" cy="424069"/>
           </a:xfrm>
           <a:prstGeom prst="rect">
@@ -5642,7 +5676,7 @@
         </p:nvSpPr>
         <p:spPr>
           <a:xfrm>
-            <a:off x="5552662" y="503583"/>
+            <a:off x="5608983" y="198770"/>
             <a:ext cx="1855305" cy="424069"/>
           </a:xfrm>
           <a:prstGeom prst="rect">
@@ -5685,17 +5719,19 @@
             </a:extLst>
           </p:cNvPr>
           <p:cNvCxnSpPr>
-            <a:endCxn id="11" idx="1"/>
+            <a:cxnSpLocks/>
           </p:cNvCxnSpPr>
           <p:nvPr/>
         </p:nvCxnSpPr>
         <p:spPr>
-          <a:xfrm rot="16200000" flipH="1">
-            <a:off x="5009322" y="172278"/>
-            <a:ext cx="715618" cy="371062"/>
-          </a:xfrm>
-          <a:prstGeom prst="bentConnector2">
-            <a:avLst/>
+          <a:xfrm>
+            <a:off x="5260281" y="111798"/>
+            <a:ext cx="352837" cy="313084"/>
+          </a:xfrm>
+          <a:prstGeom prst="bentConnector3">
+            <a:avLst>
+              <a:gd name="adj1" fmla="val -13850"/>
+            </a:avLst>
           </a:prstGeom>
           <a:ln>
             <a:tailEnd type="triangle"/>
@@ -5726,17 +5762,19 @@
             </a:extLst>
           </p:cNvPr>
           <p:cNvCxnSpPr>
-            <a:endCxn id="9" idx="3"/>
+            <a:cxnSpLocks/>
           </p:cNvCxnSpPr>
           <p:nvPr/>
         </p:nvCxnSpPr>
         <p:spPr>
-          <a:xfrm rot="5400000">
-            <a:off x="4631635" y="152401"/>
-            <a:ext cx="715618" cy="410817"/>
-          </a:xfrm>
-          <a:prstGeom prst="bentConnector2">
-            <a:avLst/>
+          <a:xfrm rot="10800000" flipV="1">
+            <a:off x="4767261" y="122584"/>
+            <a:ext cx="381208" cy="302296"/>
+          </a:xfrm>
+          <a:prstGeom prst="bentConnector3">
+            <a:avLst>
+              <a:gd name="adj1" fmla="val 1331"/>
+            </a:avLst>
           </a:prstGeom>
           <a:ln>
             <a:solidFill>
@@ -5762,10 +5800,10 @@
       </p:cxnSp>
       <p:sp>
         <p:nvSpPr>
-          <p:cNvPr id="20" name="Rectángulo 19">
-            <a:extLst>
-              <a:ext uri="{FF2B5EF4-FFF2-40B4-BE49-F238E27FC236}">
-                <a16:creationId xmlns:a16="http://schemas.microsoft.com/office/drawing/2014/main" id="{846F5CAF-EBF5-415C-92D0-082F3FCBD569}"/>
+          <p:cNvPr id="21" name="Rectángulo 20">
+            <a:extLst>
+              <a:ext uri="{FF2B5EF4-FFF2-40B4-BE49-F238E27FC236}">
+                <a16:creationId xmlns:a16="http://schemas.microsoft.com/office/drawing/2014/main" id="{B15BA710-27B4-472D-959A-15CC04E686AE}"/>
               </a:ext>
             </a:extLst>
           </p:cNvPr>
@@ -5774,55 +5812,8 @@
         </p:nvSpPr>
         <p:spPr>
           <a:xfrm>
-            <a:off x="4141303" y="1219200"/>
-            <a:ext cx="3107635" cy="424069"/>
-          </a:xfrm>
-          <a:prstGeom prst="rect">
-            <a:avLst/>
-          </a:prstGeom>
-        </p:spPr>
-        <p:style>
-          <a:lnRef idx="2">
-            <a:schemeClr val="accent3"/>
-          </a:lnRef>
-          <a:fillRef idx="1">
-            <a:schemeClr val="lt1"/>
-          </a:fillRef>
-          <a:effectRef idx="0">
-            <a:schemeClr val="accent3"/>
-          </a:effectRef>
-          <a:fontRef idx="minor">
-            <a:schemeClr val="dk1"/>
-          </a:fontRef>
-        </p:style>
-        <p:txBody>
-          <a:bodyPr rtlCol="0" anchor="ctr"/>
-          <a:lstStyle/>
-          <a:p>
-            <a:pPr algn="ctr"/>
-            <a:r>
-              <a:rPr lang="es-MX" dirty="0"/>
-              <a:t>Tirar las pastillas por el inodoro </a:t>
-            </a:r>
-          </a:p>
-        </p:txBody>
-      </p:sp>
-      <p:sp>
-        <p:nvSpPr>
-          <p:cNvPr id="21" name="Rectángulo 20">
-            <a:extLst>
-              <a:ext uri="{FF2B5EF4-FFF2-40B4-BE49-F238E27FC236}">
-                <a16:creationId xmlns:a16="http://schemas.microsoft.com/office/drawing/2014/main" id="{B15BA710-27B4-472D-959A-15CC04E686AE}"/>
-              </a:ext>
-            </a:extLst>
-          </p:cNvPr>
-          <p:cNvSpPr/>
-          <p:nvPr/>
-        </p:nvSpPr>
-        <p:spPr>
-          <a:xfrm>
-            <a:off x="874643" y="1219200"/>
-            <a:ext cx="2776331" cy="424069"/>
+            <a:off x="874643" y="1060990"/>
+            <a:ext cx="1999423" cy="582279"/>
           </a:xfrm>
           <a:prstGeom prst="rect">
             <a:avLst/>
@@ -5864,6 +5855,7 @@
             </a:extLst>
           </p:cNvPr>
           <p:cNvCxnSpPr>
+            <a:cxnSpLocks/>
             <a:stCxn id="9" idx="2"/>
             <a:endCxn id="21" idx="0"/>
           </p:cNvCxnSpPr>
@@ -5871,8 +5863,8 @@
         </p:nvCxnSpPr>
         <p:spPr>
           <a:xfrm rot="5400000">
-            <a:off x="2913822" y="276639"/>
-            <a:ext cx="291548" cy="1593574"/>
+            <a:off x="2636344" y="-152421"/>
+            <a:ext cx="451422" cy="1975400"/>
           </a:xfrm>
           <a:prstGeom prst="bentConnector3">
             <a:avLst/>
@@ -5906,18 +5898,21 @@
             </a:extLst>
           </p:cNvPr>
           <p:cNvCxnSpPr>
+            <a:cxnSpLocks/>
             <a:stCxn id="9" idx="2"/>
-            <a:endCxn id="20" idx="0"/>
+            <a:endCxn id="4" idx="0"/>
           </p:cNvCxnSpPr>
           <p:nvPr/>
         </p:nvCxnSpPr>
         <p:spPr>
           <a:xfrm rot="16200000" flipH="1">
-            <a:off x="4629978" y="154057"/>
-            <a:ext cx="291548" cy="1838738"/>
+            <a:off x="4530572" y="-71249"/>
+            <a:ext cx="397594" cy="1759228"/>
           </a:xfrm>
           <a:prstGeom prst="bentConnector3">
-            <a:avLst/>
+            <a:avLst>
+              <a:gd name="adj1" fmla="val 50000"/>
+            </a:avLst>
           </a:prstGeom>
           <a:ln>
             <a:solidFill>
@@ -5988,53 +5983,6 @@
           </a:p>
         </p:txBody>
       </p:sp>
-      <p:sp>
-        <p:nvSpPr>
-          <p:cNvPr id="27" name="Rectángulo 26">
-            <a:extLst>
-              <a:ext uri="{FF2B5EF4-FFF2-40B4-BE49-F238E27FC236}">
-                <a16:creationId xmlns:a16="http://schemas.microsoft.com/office/drawing/2014/main" id="{9FB2F73B-7998-4F6D-82C5-0BE38D7476B0}"/>
-              </a:ext>
-            </a:extLst>
-          </p:cNvPr>
-          <p:cNvSpPr/>
-          <p:nvPr/>
-        </p:nvSpPr>
-        <p:spPr>
-          <a:xfrm>
-            <a:off x="3289853" y="2120345"/>
-            <a:ext cx="2077278" cy="424069"/>
-          </a:xfrm>
-          <a:prstGeom prst="rect">
-            <a:avLst/>
-          </a:prstGeom>
-        </p:spPr>
-        <p:style>
-          <a:lnRef idx="2">
-            <a:schemeClr val="accent3"/>
-          </a:lnRef>
-          <a:fillRef idx="1">
-            <a:schemeClr val="lt1"/>
-          </a:fillRef>
-          <a:effectRef idx="0">
-            <a:schemeClr val="accent3"/>
-          </a:effectRef>
-          <a:fontRef idx="minor">
-            <a:schemeClr val="dk1"/>
-          </a:fontRef>
-        </p:style>
-        <p:txBody>
-          <a:bodyPr rtlCol="0" anchor="ctr"/>
-          <a:lstStyle/>
-          <a:p>
-            <a:pPr algn="ctr"/>
-            <a:r>
-              <a:rPr lang="es-MX" dirty="0"/>
-              <a:t>Pegarle al escritorio</a:t>
-            </a:r>
-          </a:p>
-        </p:txBody>
-      </p:sp>
       <p:cxnSp>
         <p:nvCxnSpPr>
           <p:cNvPr id="29" name="Conector: angular 28">
@@ -6045,15 +5993,16 @@
             </a:extLst>
           </p:cNvPr>
           <p:cNvCxnSpPr>
-            <a:stCxn id="20" idx="2"/>
+            <a:cxnSpLocks/>
+            <a:stCxn id="4" idx="2"/>
             <a:endCxn id="26" idx="0"/>
           </p:cNvCxnSpPr>
           <p:nvPr/>
         </p:nvCxnSpPr>
         <p:spPr>
           <a:xfrm rot="16200000" flipH="1">
-            <a:off x="6313006" y="1025384"/>
-            <a:ext cx="477077" cy="1712846"/>
+            <a:off x="6243023" y="955402"/>
+            <a:ext cx="530904" cy="1798984"/>
           </a:xfrm>
           <a:prstGeom prst="bentConnector3">
             <a:avLst/>
@@ -6088,18 +6037,20 @@
           </p:cNvPr>
           <p:cNvCxnSpPr>
             <a:cxnSpLocks/>
-            <a:stCxn id="20" idx="2"/>
-            <a:endCxn id="27" idx="0"/>
+            <a:stCxn id="4" idx="2"/>
+            <a:endCxn id="67" idx="0"/>
           </p:cNvCxnSpPr>
           <p:nvPr/>
         </p:nvCxnSpPr>
         <p:spPr>
           <a:xfrm rot="5400000">
-            <a:off x="4773269" y="1198493"/>
-            <a:ext cx="477076" cy="1366629"/>
+            <a:off x="4801657" y="1041728"/>
+            <a:ext cx="259613" cy="1355041"/>
           </a:xfrm>
           <a:prstGeom prst="bentConnector3">
-            <a:avLst/>
+            <a:avLst>
+              <a:gd name="adj1" fmla="val 50000"/>
+            </a:avLst>
           </a:prstGeom>
           <a:ln>
             <a:solidFill>
@@ -6133,19 +6084,20 @@
             </a:extLst>
           </p:cNvPr>
           <p:cNvCxnSpPr>
+            <a:cxnSpLocks/>
             <a:stCxn id="26" idx="3"/>
-            <a:endCxn id="20" idx="3"/>
+            <a:endCxn id="4" idx="3"/>
           </p:cNvCxnSpPr>
           <p:nvPr/>
         </p:nvCxnSpPr>
         <p:spPr>
           <a:xfrm flipH="1" flipV="1">
-            <a:off x="7248938" y="1431235"/>
-            <a:ext cx="1391481" cy="901146"/>
+            <a:off x="7515640" y="1298302"/>
+            <a:ext cx="1124779" cy="1034079"/>
           </a:xfrm>
           <a:prstGeom prst="bentConnector3">
             <a:avLst>
-              <a:gd name="adj1" fmla="val -16429"/>
+              <a:gd name="adj1" fmla="val -20324"/>
             </a:avLst>
           </a:prstGeom>
           <a:ln>
@@ -6169,53 +6121,6 @@
       </p:cxnSp>
       <p:sp>
         <p:nvSpPr>
-          <p:cNvPr id="39" name="Rectángulo 38">
-            <a:extLst>
-              <a:ext uri="{FF2B5EF4-FFF2-40B4-BE49-F238E27FC236}">
-                <a16:creationId xmlns:a16="http://schemas.microsoft.com/office/drawing/2014/main" id="{63EF838B-0178-4432-B8F9-6E06B16DD656}"/>
-              </a:ext>
-            </a:extLst>
-          </p:cNvPr>
-          <p:cNvSpPr/>
-          <p:nvPr/>
-        </p:nvSpPr>
-        <p:spPr>
-          <a:xfrm>
-            <a:off x="2262809" y="2809455"/>
-            <a:ext cx="1222514" cy="424069"/>
-          </a:xfrm>
-          <a:prstGeom prst="rect">
-            <a:avLst/>
-          </a:prstGeom>
-        </p:spPr>
-        <p:style>
-          <a:lnRef idx="2">
-            <a:schemeClr val="accent3"/>
-          </a:lnRef>
-          <a:fillRef idx="1">
-            <a:schemeClr val="lt1"/>
-          </a:fillRef>
-          <a:effectRef idx="0">
-            <a:schemeClr val="accent3"/>
-          </a:effectRef>
-          <a:fontRef idx="minor">
-            <a:schemeClr val="dk1"/>
-          </a:fontRef>
-        </p:style>
-        <p:txBody>
-          <a:bodyPr rtlCol="0" anchor="ctr"/>
-          <a:lstStyle/>
-          <a:p>
-            <a:pPr algn="ctr"/>
-            <a:r>
-              <a:rPr lang="es-MX" dirty="0"/>
-              <a:t>Tomar foto</a:t>
-            </a:r>
-          </a:p>
-        </p:txBody>
-      </p:sp>
-      <p:sp>
-        <p:nvSpPr>
           <p:cNvPr id="40" name="Rectángulo 39">
             <a:extLst>
               <a:ext uri="{FF2B5EF4-FFF2-40B4-BE49-F238E27FC236}">
@@ -6271,15 +6176,16 @@
             </a:extLst>
           </p:cNvPr>
           <p:cNvCxnSpPr>
-            <a:stCxn id="27" idx="2"/>
+            <a:cxnSpLocks/>
+            <a:stCxn id="67" idx="2"/>
             <a:endCxn id="40" idx="0"/>
           </p:cNvCxnSpPr>
           <p:nvPr/>
         </p:nvCxnSpPr>
         <p:spPr>
           <a:xfrm rot="16200000" flipH="1">
-            <a:off x="6385065" y="487840"/>
-            <a:ext cx="265041" cy="4378187"/>
+            <a:off x="6291250" y="394026"/>
+            <a:ext cx="378120" cy="4452737"/>
           </a:xfrm>
           <a:prstGeom prst="bentConnector3">
             <a:avLst/>
@@ -6316,17 +6222,18 @@
             </a:extLst>
           </p:cNvPr>
           <p:cNvCxnSpPr>
-            <a:stCxn id="27" idx="2"/>
-            <a:endCxn id="39" idx="0"/>
+            <a:cxnSpLocks/>
+            <a:stCxn id="67" idx="1"/>
+            <a:endCxn id="82" idx="0"/>
           </p:cNvCxnSpPr>
           <p:nvPr/>
         </p:nvCxnSpPr>
         <p:spPr>
-          <a:xfrm rot="5400000">
-            <a:off x="3468759" y="1949721"/>
-            <a:ext cx="265041" cy="1454426"/>
-          </a:xfrm>
-          <a:prstGeom prst="bentConnector3">
+          <a:xfrm rot="10800000" flipV="1">
+            <a:off x="2500314" y="2140195"/>
+            <a:ext cx="570871" cy="86956"/>
+          </a:xfrm>
+          <a:prstGeom prst="bentConnector2">
             <a:avLst/>
           </a:prstGeom>
           <a:ln>
@@ -6353,10 +6260,10 @@
       </p:cxnSp>
       <p:sp>
         <p:nvSpPr>
-          <p:cNvPr id="45" name="Rectángulo 44">
-            <a:extLst>
-              <a:ext uri="{FF2B5EF4-FFF2-40B4-BE49-F238E27FC236}">
-                <a16:creationId xmlns:a16="http://schemas.microsoft.com/office/drawing/2014/main" id="{9E48949B-7351-4996-9A79-AF5C53750830}"/>
+          <p:cNvPr id="46" name="Rectángulo 45">
+            <a:extLst>
+              <a:ext uri="{FF2B5EF4-FFF2-40B4-BE49-F238E27FC236}">
+                <a16:creationId xmlns:a16="http://schemas.microsoft.com/office/drawing/2014/main" id="{7AE2C6A7-DBA3-4352-B7F5-8BA7E8F51FE6}"/>
               </a:ext>
             </a:extLst>
           </p:cNvPr>
@@ -6365,54 +6272,7 @@
         </p:nvSpPr>
         <p:spPr>
           <a:xfrm>
-            <a:off x="2171287" y="3405816"/>
-            <a:ext cx="2405270" cy="424069"/>
-          </a:xfrm>
-          <a:prstGeom prst="rect">
-            <a:avLst/>
-          </a:prstGeom>
-        </p:spPr>
-        <p:style>
-          <a:lnRef idx="2">
-            <a:schemeClr val="accent3"/>
-          </a:lnRef>
-          <a:fillRef idx="1">
-            <a:schemeClr val="lt1"/>
-          </a:fillRef>
-          <a:effectRef idx="0">
-            <a:schemeClr val="accent3"/>
-          </a:effectRef>
-          <a:fontRef idx="minor">
-            <a:schemeClr val="dk1"/>
-          </a:fontRef>
-        </p:style>
-        <p:txBody>
-          <a:bodyPr rtlCol="0" anchor="ctr"/>
-          <a:lstStyle/>
-          <a:p>
-            <a:pPr algn="ctr"/>
-            <a:r>
-              <a:rPr lang="es-MX" dirty="0"/>
-              <a:t>Tirar té sobre la computadora</a:t>
-            </a:r>
-          </a:p>
-        </p:txBody>
-      </p:sp>
-      <p:sp>
-        <p:nvSpPr>
-          <p:cNvPr id="46" name="Rectángulo 45">
-            <a:extLst>
-              <a:ext uri="{FF2B5EF4-FFF2-40B4-BE49-F238E27FC236}">
-                <a16:creationId xmlns:a16="http://schemas.microsoft.com/office/drawing/2014/main" id="{7AE2C6A7-DBA3-4352-B7F5-8BA7E8F51FE6}"/>
-              </a:ext>
-            </a:extLst>
-          </p:cNvPr>
-          <p:cNvSpPr/>
-          <p:nvPr/>
-        </p:nvSpPr>
-        <p:spPr>
-          <a:xfrm>
-            <a:off x="77857" y="3412441"/>
+            <a:off x="211409" y="2633652"/>
             <a:ext cx="1441174" cy="424069"/>
           </a:xfrm>
           <a:prstGeom prst="rect">
@@ -6456,17 +6316,17 @@
           </p:cNvPr>
           <p:cNvCxnSpPr>
             <a:cxnSpLocks/>
-            <a:stCxn id="39" idx="2"/>
+            <a:stCxn id="82" idx="1"/>
             <a:endCxn id="46" idx="0"/>
           </p:cNvCxnSpPr>
           <p:nvPr/>
         </p:nvCxnSpPr>
         <p:spPr>
-          <a:xfrm rot="5400000">
-            <a:off x="1746797" y="2285171"/>
-            <a:ext cx="178917" cy="2075622"/>
-          </a:xfrm>
-          <a:prstGeom prst="bentConnector3">
+          <a:xfrm rot="10800000" flipV="1">
+            <a:off x="931996" y="2518290"/>
+            <a:ext cx="768016" cy="115361"/>
+          </a:xfrm>
+          <a:prstGeom prst="bentConnector2">
             <a:avLst/>
           </a:prstGeom>
           <a:ln>
@@ -6499,15 +6359,15 @@
           </p:cNvPr>
           <p:cNvCxnSpPr>
             <a:cxnSpLocks/>
-            <a:stCxn id="39" idx="2"/>
-            <a:endCxn id="45" idx="0"/>
+            <a:stCxn id="82" idx="2"/>
+            <a:endCxn id="87" idx="0"/>
           </p:cNvCxnSpPr>
           <p:nvPr/>
         </p:nvCxnSpPr>
         <p:spPr>
           <a:xfrm rot="16200000" flipH="1">
-            <a:off x="3037848" y="3069742"/>
-            <a:ext cx="172292" cy="499856"/>
+            <a:off x="2836124" y="2473620"/>
+            <a:ext cx="382750" cy="1054372"/>
           </a:xfrm>
           <a:prstGeom prst="bentConnector3">
             <a:avLst/>
@@ -6548,7 +6408,7 @@
         </p:nvSpPr>
         <p:spPr>
           <a:xfrm>
-            <a:off x="1822589" y="4118104"/>
+            <a:off x="1817621" y="4358328"/>
             <a:ext cx="1340954" cy="424069"/>
           </a:xfrm>
           <a:prstGeom prst="rect">
@@ -6577,53 +6437,6 @@
             <a:r>
               <a:rPr lang="es-MX" dirty="0"/>
               <a:t>Soy Netflix</a:t>
-            </a:r>
-          </a:p>
-        </p:txBody>
-      </p:sp>
-      <p:sp>
-        <p:nvSpPr>
-          <p:cNvPr id="52" name="Rectángulo 51">
-            <a:extLst>
-              <a:ext uri="{FF2B5EF4-FFF2-40B4-BE49-F238E27FC236}">
-                <a16:creationId xmlns:a16="http://schemas.microsoft.com/office/drawing/2014/main" id="{4482D0D1-E47B-41E6-8273-61E3E806CFED}"/>
-              </a:ext>
-            </a:extLst>
-          </p:cNvPr>
-          <p:cNvSpPr/>
-          <p:nvPr/>
-        </p:nvSpPr>
-        <p:spPr>
-          <a:xfrm>
-            <a:off x="4066348" y="4118104"/>
-            <a:ext cx="1020418" cy="424069"/>
-          </a:xfrm>
-          <a:prstGeom prst="rect">
-            <a:avLst/>
-          </a:prstGeom>
-        </p:spPr>
-        <p:style>
-          <a:lnRef idx="2">
-            <a:schemeClr val="accent3"/>
-          </a:lnRef>
-          <a:fillRef idx="1">
-            <a:schemeClr val="lt1"/>
-          </a:fillRef>
-          <a:effectRef idx="0">
-            <a:schemeClr val="accent3"/>
-          </a:effectRef>
-          <a:fontRef idx="minor">
-            <a:schemeClr val="dk1"/>
-          </a:fontRef>
-        </p:style>
-        <p:txBody>
-          <a:bodyPr rtlCol="0" anchor="ctr"/>
-          <a:lstStyle/>
-          <a:p>
-            <a:pPr algn="ctr"/>
-            <a:r>
-              <a:rPr lang="es-MX" dirty="0"/>
-              <a:t>Símbolo</a:t>
             </a:r>
           </a:p>
         </p:txBody>
@@ -6639,15 +6452,15 @@
           </p:cNvPr>
           <p:cNvCxnSpPr>
             <a:cxnSpLocks/>
-            <a:stCxn id="45" idx="2"/>
+            <a:stCxn id="87" idx="2"/>
             <a:endCxn id="51" idx="0"/>
           </p:cNvCxnSpPr>
           <p:nvPr/>
         </p:nvCxnSpPr>
         <p:spPr>
           <a:xfrm rot="5400000">
-            <a:off x="2789385" y="3533566"/>
-            <a:ext cx="288219" cy="880856"/>
+            <a:off x="2729459" y="3533101"/>
+            <a:ext cx="583867" cy="1066587"/>
           </a:xfrm>
           <a:prstGeom prst="bentConnector3">
             <a:avLst/>
@@ -6682,18 +6495,21 @@
           </p:cNvPr>
           <p:cNvCxnSpPr>
             <a:cxnSpLocks/>
-            <a:stCxn id="45" idx="2"/>
-            <a:endCxn id="52" idx="0"/>
+            <a:stCxn id="87" idx="3"/>
+            <a:endCxn id="103" idx="0"/>
           </p:cNvCxnSpPr>
           <p:nvPr/>
         </p:nvCxnSpPr>
         <p:spPr>
-          <a:xfrm rot="16200000" flipH="1">
-            <a:off x="3831130" y="3372676"/>
-            <a:ext cx="288219" cy="1202635"/>
-          </a:xfrm>
-          <a:prstGeom prst="bentConnector3">
-            <a:avLst/>
+          <a:xfrm flipH="1">
+            <a:off x="4541143" y="3483321"/>
+            <a:ext cx="488052" cy="688601"/>
+          </a:xfrm>
+          <a:prstGeom prst="bentConnector4">
+            <a:avLst>
+              <a:gd name="adj1" fmla="val -46839"/>
+              <a:gd name="adj2" fmla="val 71140"/>
+            </a:avLst>
           </a:prstGeom>
           <a:ln>
             <a:solidFill>
@@ -6731,7 +6547,7 @@
         </p:nvSpPr>
         <p:spPr>
           <a:xfrm>
-            <a:off x="1598959" y="4754208"/>
+            <a:off x="1598959" y="4950116"/>
             <a:ext cx="1774963" cy="424069"/>
           </a:xfrm>
           <a:prstGeom prst="rect">
@@ -6782,8 +6598,8 @@
         </p:nvCxnSpPr>
         <p:spPr>
           <a:xfrm flipH="1">
-            <a:off x="2486441" y="4542173"/>
-            <a:ext cx="6625" cy="212035"/>
+            <a:off x="2486441" y="4782397"/>
+            <a:ext cx="1657" cy="167719"/>
           </a:xfrm>
           <a:prstGeom prst="straightConnector1">
             <a:avLst/>
@@ -6821,7 +6637,7 @@
         </p:nvSpPr>
         <p:spPr>
           <a:xfrm>
-            <a:off x="1692137" y="5506279"/>
+            <a:off x="1692137" y="5584975"/>
             <a:ext cx="1601857" cy="424069"/>
           </a:xfrm>
           <a:prstGeom prst="rect">
@@ -6872,8 +6688,8 @@
         </p:nvCxnSpPr>
         <p:spPr>
           <a:xfrm>
-            <a:off x="2486441" y="5178277"/>
-            <a:ext cx="6625" cy="328002"/>
+            <a:off x="2486441" y="5374185"/>
+            <a:ext cx="6625" cy="210790"/>
           </a:xfrm>
           <a:prstGeom prst="straightConnector1">
             <a:avLst/>
@@ -6911,7 +6727,7 @@
         </p:nvSpPr>
         <p:spPr>
           <a:xfrm>
-            <a:off x="1963807" y="6192065"/>
+            <a:off x="1957182" y="6302651"/>
             <a:ext cx="1058518" cy="424069"/>
           </a:xfrm>
           <a:prstGeom prst="rect">
@@ -6960,9 +6776,9 @@
           <p:nvPr/>
         </p:nvCxnSpPr>
         <p:spPr>
-          <a:xfrm>
-            <a:off x="2493066" y="5930348"/>
-            <a:ext cx="0" cy="261717"/>
+          <a:xfrm flipH="1">
+            <a:off x="2486441" y="6009044"/>
+            <a:ext cx="6625" cy="293607"/>
           </a:xfrm>
           <a:prstGeom prst="straightConnector1">
             <a:avLst/>
@@ -7002,7 +6818,7 @@
         </p:nvCxnSpPr>
         <p:spPr>
           <a:xfrm>
-            <a:off x="2493066" y="6616134"/>
+            <a:off x="2486441" y="6726720"/>
             <a:ext cx="0" cy="291549"/>
           </a:xfrm>
           <a:prstGeom prst="straightConnector1">
@@ -7038,14 +6854,14 @@
           </p:cNvPr>
           <p:cNvCxnSpPr>
             <a:cxnSpLocks/>
-            <a:endCxn id="45" idx="1"/>
+            <a:endCxn id="87" idx="1"/>
           </p:cNvCxnSpPr>
           <p:nvPr/>
         </p:nvCxnSpPr>
         <p:spPr>
           <a:xfrm rot="5400000" flipH="1" flipV="1">
-            <a:off x="149084" y="4965023"/>
-            <a:ext cx="3369374" cy="675031"/>
+            <a:off x="36261" y="4943316"/>
+            <a:ext cx="3503907" cy="583919"/>
           </a:xfrm>
           <a:prstGeom prst="bentConnector2">
             <a:avLst/>
@@ -7083,7 +6899,7 @@
         </p:nvSpPr>
         <p:spPr>
           <a:xfrm>
-            <a:off x="5321164" y="4729352"/>
+            <a:off x="5940911" y="5495708"/>
             <a:ext cx="1316934" cy="424069"/>
           </a:xfrm>
           <a:prstGeom prst="rect">
@@ -7130,7 +6946,7 @@
         </p:nvSpPr>
         <p:spPr>
           <a:xfrm>
-            <a:off x="3534190" y="4730189"/>
+            <a:off x="3658846" y="5524285"/>
             <a:ext cx="1489211" cy="424069"/>
           </a:xfrm>
           <a:prstGeom prst="rect">
@@ -7173,18 +6989,22 @@
             </a:extLst>
           </p:cNvPr>
           <p:cNvCxnSpPr>
-            <a:stCxn id="52" idx="2"/>
+            <a:cxnSpLocks/>
+            <a:stCxn id="103" idx="1"/>
             <a:endCxn id="37" idx="0"/>
           </p:cNvCxnSpPr>
           <p:nvPr/>
         </p:nvCxnSpPr>
         <p:spPr>
-          <a:xfrm rot="5400000">
-            <a:off x="4333669" y="4487301"/>
-            <a:ext cx="188016" cy="297761"/>
-          </a:xfrm>
-          <a:prstGeom prst="bentConnector3">
-            <a:avLst/>
+          <a:xfrm rot="10800000" flipH="1" flipV="1">
+            <a:off x="3601062" y="4463061"/>
+            <a:ext cx="802389" cy="1061223"/>
+          </a:xfrm>
+          <a:prstGeom prst="bentConnector4">
+            <a:avLst>
+              <a:gd name="adj1" fmla="val -28490"/>
+              <a:gd name="adj2" fmla="val 63717"/>
+            </a:avLst>
           </a:prstGeom>
           <a:ln>
             <a:solidFill>
@@ -7218,15 +7038,16 @@
             </a:extLst>
           </p:cNvPr>
           <p:cNvCxnSpPr>
+            <a:cxnSpLocks/>
             <a:stCxn id="36" idx="0"/>
-            <a:endCxn id="52" idx="3"/>
+            <a:endCxn id="103" idx="3"/>
           </p:cNvCxnSpPr>
           <p:nvPr/>
         </p:nvCxnSpPr>
         <p:spPr>
           <a:xfrm rot="16200000" flipV="1">
-            <a:off x="5333593" y="4083313"/>
-            <a:ext cx="399213" cy="892865"/>
+            <a:off x="5523978" y="4420307"/>
+            <a:ext cx="1032646" cy="1118155"/>
           </a:xfrm>
           <a:prstGeom prst="bentConnector2">
             <a:avLst/>
@@ -7263,18 +7084,21 @@
             </a:extLst>
           </p:cNvPr>
           <p:cNvCxnSpPr>
-            <a:stCxn id="52" idx="2"/>
+            <a:cxnSpLocks/>
+            <a:stCxn id="103" idx="2"/>
             <a:endCxn id="36" idx="0"/>
           </p:cNvCxnSpPr>
           <p:nvPr/>
         </p:nvCxnSpPr>
         <p:spPr>
           <a:xfrm rot="16200000" flipH="1">
-            <a:off x="5184505" y="3934225"/>
-            <a:ext cx="187179" cy="1403074"/>
+            <a:off x="5199507" y="4095837"/>
+            <a:ext cx="741506" cy="2058235"/>
           </a:xfrm>
           <a:prstGeom prst="bentConnector3">
-            <a:avLst/>
+            <a:avLst>
+              <a:gd name="adj1" fmla="val 50000"/>
+            </a:avLst>
           </a:prstGeom>
           <a:ln>
             <a:solidFill>
@@ -7307,19 +7131,20 @@
             </a:extLst>
           </p:cNvPr>
           <p:cNvCxnSpPr>
-            <a:stCxn id="52" idx="3"/>
-            <a:endCxn id="27" idx="3"/>
+            <a:cxnSpLocks/>
+            <a:stCxn id="103" idx="3"/>
+            <a:endCxn id="67" idx="3"/>
           </p:cNvCxnSpPr>
           <p:nvPr/>
         </p:nvCxnSpPr>
         <p:spPr>
-          <a:xfrm flipV="1">
-            <a:off x="5086766" y="2332380"/>
-            <a:ext cx="280365" cy="1997759"/>
+          <a:xfrm flipH="1" flipV="1">
+            <a:off x="5436699" y="2140195"/>
+            <a:ext cx="44524" cy="2322867"/>
           </a:xfrm>
           <a:prstGeom prst="bentConnector3">
             <a:avLst>
-              <a:gd name="adj1" fmla="val 181537"/>
+              <a:gd name="adj1" fmla="val -513431"/>
             </a:avLst>
           </a:prstGeom>
           <a:ln>
@@ -7848,6 +7673,241 @@
           </a:fontRef>
         </p:style>
       </p:cxnSp>
+      <p:sp>
+        <p:nvSpPr>
+          <p:cNvPr id="4" name="Diagrama de flujo: decisión 3">
+            <a:extLst>
+              <a:ext uri="{FF2B5EF4-FFF2-40B4-BE49-F238E27FC236}">
+                <a16:creationId xmlns:a16="http://schemas.microsoft.com/office/drawing/2014/main" id="{FFF43706-517F-43FB-B9FB-4E6DF23F9DC4}"/>
+              </a:ext>
+            </a:extLst>
+          </p:cNvPr>
+          <p:cNvSpPr/>
+          <p:nvPr/>
+        </p:nvSpPr>
+        <p:spPr>
+          <a:xfrm>
+            <a:off x="3702326" y="1007162"/>
+            <a:ext cx="3813314" cy="582280"/>
+          </a:xfrm>
+          <a:prstGeom prst="flowChartDecision">
+            <a:avLst/>
+          </a:prstGeom>
+        </p:spPr>
+        <p:style>
+          <a:lnRef idx="2">
+            <a:schemeClr val="accent3"/>
+          </a:lnRef>
+          <a:fillRef idx="1">
+            <a:schemeClr val="lt1"/>
+          </a:fillRef>
+          <a:effectRef idx="0">
+            <a:schemeClr val="accent3"/>
+          </a:effectRef>
+          <a:fontRef idx="minor">
+            <a:schemeClr val="dk1"/>
+          </a:fontRef>
+        </p:style>
+        <p:txBody>
+          <a:bodyPr rtlCol="0" anchor="ctr"/>
+          <a:lstStyle/>
+          <a:p>
+            <a:pPr algn="ctr"/>
+            <a:r>
+              <a:rPr lang="es-MX" dirty="0"/>
+              <a:t>Tirar pastillas por el inodoro</a:t>
+            </a:r>
+          </a:p>
+        </p:txBody>
+      </p:sp>
+      <p:sp>
+        <p:nvSpPr>
+          <p:cNvPr id="67" name="Diagrama de flujo: decisión 66">
+            <a:extLst>
+              <a:ext uri="{FF2B5EF4-FFF2-40B4-BE49-F238E27FC236}">
+                <a16:creationId xmlns:a16="http://schemas.microsoft.com/office/drawing/2014/main" id="{D13E6574-2894-44F0-ADDB-7D6A0C00E9FB}"/>
+              </a:ext>
+            </a:extLst>
+          </p:cNvPr>
+          <p:cNvSpPr/>
+          <p:nvPr/>
+        </p:nvSpPr>
+        <p:spPr>
+          <a:xfrm>
+            <a:off x="3071184" y="1849055"/>
+            <a:ext cx="2365515" cy="582280"/>
+          </a:xfrm>
+          <a:prstGeom prst="flowChartDecision">
+            <a:avLst/>
+          </a:prstGeom>
+        </p:spPr>
+        <p:style>
+          <a:lnRef idx="2">
+            <a:schemeClr val="accent3"/>
+          </a:lnRef>
+          <a:fillRef idx="1">
+            <a:schemeClr val="lt1"/>
+          </a:fillRef>
+          <a:effectRef idx="0">
+            <a:schemeClr val="accent3"/>
+          </a:effectRef>
+          <a:fontRef idx="minor">
+            <a:schemeClr val="dk1"/>
+          </a:fontRef>
+        </p:style>
+        <p:txBody>
+          <a:bodyPr rtlCol="0" anchor="ctr"/>
+          <a:lstStyle/>
+          <a:p>
+            <a:pPr algn="ctr"/>
+            <a:r>
+              <a:rPr lang="es-MX" dirty="0"/>
+              <a:t>Pegarle al escritorio</a:t>
+            </a:r>
+          </a:p>
+        </p:txBody>
+      </p:sp>
+      <p:sp>
+        <p:nvSpPr>
+          <p:cNvPr id="82" name="Diagrama de flujo: decisión 81">
+            <a:extLst>
+              <a:ext uri="{FF2B5EF4-FFF2-40B4-BE49-F238E27FC236}">
+                <a16:creationId xmlns:a16="http://schemas.microsoft.com/office/drawing/2014/main" id="{09C283EA-25D7-44BE-AAA7-136458BAA9C3}"/>
+              </a:ext>
+            </a:extLst>
+          </p:cNvPr>
+          <p:cNvSpPr/>
+          <p:nvPr/>
+        </p:nvSpPr>
+        <p:spPr>
+          <a:xfrm>
+            <a:off x="1700012" y="2227151"/>
+            <a:ext cx="1600601" cy="582280"/>
+          </a:xfrm>
+          <a:prstGeom prst="flowChartDecision">
+            <a:avLst/>
+          </a:prstGeom>
+        </p:spPr>
+        <p:style>
+          <a:lnRef idx="2">
+            <a:schemeClr val="accent3"/>
+          </a:lnRef>
+          <a:fillRef idx="1">
+            <a:schemeClr val="lt1"/>
+          </a:fillRef>
+          <a:effectRef idx="0">
+            <a:schemeClr val="accent3"/>
+          </a:effectRef>
+          <a:fontRef idx="minor">
+            <a:schemeClr val="dk1"/>
+          </a:fontRef>
+        </p:style>
+        <p:txBody>
+          <a:bodyPr rtlCol="0" anchor="ctr"/>
+          <a:lstStyle/>
+          <a:p>
+            <a:pPr algn="ctr"/>
+            <a:r>
+              <a:rPr lang="es-MX" dirty="0"/>
+              <a:t>Tomar foto</a:t>
+            </a:r>
+          </a:p>
+        </p:txBody>
+      </p:sp>
+      <p:sp>
+        <p:nvSpPr>
+          <p:cNvPr id="87" name="Diagrama de flujo: decisión 86">
+            <a:extLst>
+              <a:ext uri="{FF2B5EF4-FFF2-40B4-BE49-F238E27FC236}">
+                <a16:creationId xmlns:a16="http://schemas.microsoft.com/office/drawing/2014/main" id="{7A70F804-6AB3-4009-892B-92893A636362}"/>
+              </a:ext>
+            </a:extLst>
+          </p:cNvPr>
+          <p:cNvSpPr/>
+          <p:nvPr/>
+        </p:nvSpPr>
+        <p:spPr>
+          <a:xfrm>
+            <a:off x="2080174" y="3192181"/>
+            <a:ext cx="2949021" cy="582280"/>
+          </a:xfrm>
+          <a:prstGeom prst="flowChartDecision">
+            <a:avLst/>
+          </a:prstGeom>
+        </p:spPr>
+        <p:style>
+          <a:lnRef idx="2">
+            <a:schemeClr val="accent3"/>
+          </a:lnRef>
+          <a:fillRef idx="1">
+            <a:schemeClr val="lt1"/>
+          </a:fillRef>
+          <a:effectRef idx="0">
+            <a:schemeClr val="accent3"/>
+          </a:effectRef>
+          <a:fontRef idx="minor">
+            <a:schemeClr val="dk1"/>
+          </a:fontRef>
+        </p:style>
+        <p:txBody>
+          <a:bodyPr rtlCol="0" anchor="ctr"/>
+          <a:lstStyle/>
+          <a:p>
+            <a:pPr algn="ctr"/>
+            <a:r>
+              <a:rPr lang="es-MX" dirty="0"/>
+              <a:t>Tirar té en la computadora</a:t>
+            </a:r>
+          </a:p>
+        </p:txBody>
+      </p:sp>
+      <p:sp>
+        <p:nvSpPr>
+          <p:cNvPr id="103" name="Diagrama de flujo: decisión 102">
+            <a:extLst>
+              <a:ext uri="{FF2B5EF4-FFF2-40B4-BE49-F238E27FC236}">
+                <a16:creationId xmlns:a16="http://schemas.microsoft.com/office/drawing/2014/main" id="{208E1EA8-4CD4-445B-9C24-5075889D65E4}"/>
+              </a:ext>
+            </a:extLst>
+          </p:cNvPr>
+          <p:cNvSpPr/>
+          <p:nvPr/>
+        </p:nvSpPr>
+        <p:spPr>
+          <a:xfrm>
+            <a:off x="3601063" y="4171922"/>
+            <a:ext cx="1880160" cy="582280"/>
+          </a:xfrm>
+          <a:prstGeom prst="flowChartDecision">
+            <a:avLst/>
+          </a:prstGeom>
+        </p:spPr>
+        <p:style>
+          <a:lnRef idx="2">
+            <a:schemeClr val="accent3"/>
+          </a:lnRef>
+          <a:fillRef idx="1">
+            <a:schemeClr val="lt1"/>
+          </a:fillRef>
+          <a:effectRef idx="0">
+            <a:schemeClr val="accent3"/>
+          </a:effectRef>
+          <a:fontRef idx="minor">
+            <a:schemeClr val="dk1"/>
+          </a:fontRef>
+        </p:style>
+        <p:txBody>
+          <a:bodyPr rtlCol="0" anchor="ctr"/>
+          <a:lstStyle/>
+          <a:p>
+            <a:pPr algn="ctr"/>
+            <a:r>
+              <a:rPr lang="es-MX" dirty="0"/>
+              <a:t>Símbolo</a:t>
+            </a:r>
+          </a:p>
+        </p:txBody>
+      </p:sp>
     </p:spTree>
     <p:extLst>
       <p:ext uri="{BB962C8B-B14F-4D97-AF65-F5344CB8AC3E}">
@@ -7980,7 +8040,7 @@
         </p:nvSpPr>
         <p:spPr>
           <a:xfrm>
-            <a:off x="1424608" y="1709531"/>
+            <a:off x="1526897" y="2358889"/>
             <a:ext cx="2001079" cy="424070"/>
           </a:xfrm>
           <a:prstGeom prst="rect">
@@ -8009,53 +8069,6 @@
             <a:r>
               <a:rPr lang="es-MX" dirty="0"/>
               <a:t>Patada en las bolas</a:t>
-            </a:r>
-          </a:p>
-        </p:txBody>
-      </p:sp>
-      <p:sp>
-        <p:nvSpPr>
-          <p:cNvPr id="8" name="Rectángulo 7">
-            <a:extLst>
-              <a:ext uri="{FF2B5EF4-FFF2-40B4-BE49-F238E27FC236}">
-                <a16:creationId xmlns:a16="http://schemas.microsoft.com/office/drawing/2014/main" id="{53B283E0-1FE2-40B9-AB3E-C29786D85A14}"/>
-              </a:ext>
-            </a:extLst>
-          </p:cNvPr>
-          <p:cNvSpPr/>
-          <p:nvPr/>
-        </p:nvSpPr>
-        <p:spPr>
-          <a:xfrm>
-            <a:off x="3578088" y="1086679"/>
-            <a:ext cx="2319131" cy="424070"/>
-          </a:xfrm>
-          <a:prstGeom prst="rect">
-            <a:avLst/>
-          </a:prstGeom>
-        </p:spPr>
-        <p:style>
-          <a:lnRef idx="2">
-            <a:schemeClr val="accent3"/>
-          </a:lnRef>
-          <a:fillRef idx="1">
-            <a:schemeClr val="lt1"/>
-          </a:fillRef>
-          <a:effectRef idx="0">
-            <a:schemeClr val="accent3"/>
-          </a:effectRef>
-          <a:fontRef idx="minor">
-            <a:schemeClr val="dk1"/>
-          </a:fontRef>
-        </p:style>
-        <p:txBody>
-          <a:bodyPr rtlCol="0" anchor="ctr"/>
-          <a:lstStyle/>
-          <a:p>
-            <a:pPr algn="ctr"/>
-            <a:r>
-              <a:rPr lang="es-MX" dirty="0"/>
-              <a:t>Enfrentarla</a:t>
             </a:r>
           </a:p>
         </p:txBody>
@@ -8070,14 +8083,16 @@
             </a:extLst>
           </p:cNvPr>
           <p:cNvCxnSpPr>
+            <a:cxnSpLocks/>
             <a:stCxn id="4" idx="2"/>
+            <a:endCxn id="2" idx="0"/>
           </p:cNvCxnSpPr>
           <p:nvPr/>
         </p:nvCxnSpPr>
         <p:spPr>
-          <a:xfrm flipH="1">
-            <a:off x="4565374" y="808383"/>
-            <a:ext cx="1" cy="278296"/>
+          <a:xfrm>
+            <a:off x="4565375" y="808383"/>
+            <a:ext cx="2901" cy="298169"/>
           </a:xfrm>
           <a:prstGeom prst="straightConnector1">
             <a:avLst/>
@@ -8111,17 +8126,18 @@
             </a:extLst>
           </p:cNvPr>
           <p:cNvCxnSpPr>
-            <a:stCxn id="8" idx="2"/>
+            <a:cxnSpLocks/>
+            <a:stCxn id="2" idx="1"/>
             <a:endCxn id="7" idx="0"/>
           </p:cNvCxnSpPr>
           <p:nvPr/>
         </p:nvCxnSpPr>
         <p:spPr>
-          <a:xfrm rot="5400000">
-            <a:off x="3482010" y="453887"/>
-            <a:ext cx="198782" cy="2312506"/>
-          </a:xfrm>
-          <a:prstGeom prst="bentConnector3">
+          <a:xfrm rot="10800000" flipV="1">
+            <a:off x="2527438" y="1452765"/>
+            <a:ext cx="771943" cy="906124"/>
+          </a:xfrm>
+          <a:prstGeom prst="bentConnector2">
             <a:avLst/>
           </a:prstGeom>
           <a:ln>
@@ -8157,7 +8173,7 @@
         </p:nvSpPr>
         <p:spPr>
           <a:xfrm>
-            <a:off x="3949148" y="1722784"/>
+            <a:off x="4229097" y="2355560"/>
             <a:ext cx="1762539" cy="424070"/>
           </a:xfrm>
           <a:prstGeom prst="rect">
@@ -8200,18 +8216,22 @@
             </a:extLst>
           </p:cNvPr>
           <p:cNvCxnSpPr>
-            <a:stCxn id="8" idx="2"/>
+            <a:cxnSpLocks/>
+            <a:stCxn id="2" idx="3"/>
             <a:endCxn id="15" idx="0"/>
           </p:cNvCxnSpPr>
           <p:nvPr/>
         </p:nvCxnSpPr>
         <p:spPr>
-          <a:xfrm rot="16200000" flipH="1">
-            <a:off x="4678019" y="1570384"/>
-            <a:ext cx="212035" cy="92764"/>
-          </a:xfrm>
-          <a:prstGeom prst="bentConnector3">
-            <a:avLst/>
+          <a:xfrm flipH="1">
+            <a:off x="5110367" y="1452765"/>
+            <a:ext cx="726804" cy="902795"/>
+          </a:xfrm>
+          <a:prstGeom prst="bentConnector4">
+            <a:avLst>
+              <a:gd name="adj1" fmla="val -31453"/>
+              <a:gd name="adj2" fmla="val 69175"/>
+            </a:avLst>
           </a:prstGeom>
           <a:ln>
             <a:tailEnd type="triangle"/>
@@ -8246,7 +8266,7 @@
         </p:nvSpPr>
         <p:spPr>
           <a:xfrm>
-            <a:off x="1106557" y="2332383"/>
+            <a:off x="945045" y="3346168"/>
             <a:ext cx="1610140" cy="424070"/>
           </a:xfrm>
           <a:prstGeom prst="rect">
@@ -8296,8 +8316,8 @@
         </p:nvCxnSpPr>
         <p:spPr>
           <a:xfrm rot="5400000">
-            <a:off x="2068997" y="1976232"/>
-            <a:ext cx="198782" cy="513521"/>
+            <a:off x="1857172" y="2675902"/>
+            <a:ext cx="563209" cy="777322"/>
           </a:xfrm>
           <a:prstGeom prst="bentConnector3">
             <a:avLst/>
@@ -8331,14 +8351,15 @@
             </a:extLst>
           </p:cNvPr>
           <p:cNvCxnSpPr>
+            <a:cxnSpLocks/>
             <a:stCxn id="18" idx="1"/>
           </p:cNvCxnSpPr>
           <p:nvPr/>
         </p:nvCxnSpPr>
         <p:spPr>
           <a:xfrm rot="10800000">
-            <a:off x="901147" y="0"/>
-            <a:ext cx="205410" cy="2544418"/>
+            <a:off x="740049" y="1"/>
+            <a:ext cx="204996" cy="3558203"/>
           </a:xfrm>
           <a:prstGeom prst="bentConnector2">
             <a:avLst/>
@@ -8368,13 +8389,16 @@
               </a:ext>
             </a:extLst>
           </p:cNvPr>
-          <p:cNvCxnSpPr/>
+          <p:cNvCxnSpPr>
+            <a:cxnSpLocks/>
+            <a:endCxn id="31" idx="0"/>
+          </p:cNvCxnSpPr>
           <p:nvPr/>
         </p:nvCxnSpPr>
         <p:spPr>
           <a:xfrm>
-            <a:off x="9037983" y="0"/>
-            <a:ext cx="0" cy="384313"/>
+            <a:off x="9015634" y="-13253"/>
+            <a:ext cx="0" cy="508549"/>
           </a:xfrm>
           <a:prstGeom prst="straightConnector1">
             <a:avLst/>
@@ -8403,10 +8427,10 @@
       </p:cxnSp>
       <p:sp>
         <p:nvSpPr>
-          <p:cNvPr id="19" name="Rectángulo 18">
-            <a:extLst>
-              <a:ext uri="{FF2B5EF4-FFF2-40B4-BE49-F238E27FC236}">
-                <a16:creationId xmlns:a16="http://schemas.microsoft.com/office/drawing/2014/main" id="{83BABFD5-4405-45DD-A268-39DCF0A698BC}"/>
+          <p:cNvPr id="21" name="Rectángulo 20">
+            <a:extLst>
+              <a:ext uri="{FF2B5EF4-FFF2-40B4-BE49-F238E27FC236}">
+                <a16:creationId xmlns:a16="http://schemas.microsoft.com/office/drawing/2014/main" id="{90DAE1B3-6BAA-4F9D-A57A-C66C0593D3AD}"/>
               </a:ext>
             </a:extLst>
           </p:cNvPr>
@@ -8415,8 +8439,8 @@
         </p:nvSpPr>
         <p:spPr>
           <a:xfrm>
-            <a:off x="8338930" y="384313"/>
-            <a:ext cx="1398105" cy="424069"/>
+            <a:off x="7894984" y="1729389"/>
+            <a:ext cx="493645" cy="424069"/>
           </a:xfrm>
           <a:prstGeom prst="rect">
             <a:avLst/>
@@ -8443,17 +8467,17 @@
             <a:pPr algn="ctr"/>
             <a:r>
               <a:rPr lang="es-MX" dirty="0"/>
-              <a:t>Ir con mamá</a:t>
-            </a:r>
-          </a:p>
-        </p:txBody>
-      </p:sp>
-      <p:sp>
-        <p:nvSpPr>
-          <p:cNvPr id="21" name="Rectángulo 20">
-            <a:extLst>
-              <a:ext uri="{FF2B5EF4-FFF2-40B4-BE49-F238E27FC236}">
-                <a16:creationId xmlns:a16="http://schemas.microsoft.com/office/drawing/2014/main" id="{90DAE1B3-6BAA-4F9D-A57A-C66C0593D3AD}"/>
+              <a:t>Sí</a:t>
+            </a:r>
+          </a:p>
+        </p:txBody>
+      </p:sp>
+      <p:sp>
+        <p:nvSpPr>
+          <p:cNvPr id="23" name="Rectángulo 22">
+            <a:extLst>
+              <a:ext uri="{FF2B5EF4-FFF2-40B4-BE49-F238E27FC236}">
+                <a16:creationId xmlns:a16="http://schemas.microsoft.com/office/drawing/2014/main" id="{21563E7D-84B4-47FF-B154-41AAFC5B9703}"/>
               </a:ext>
             </a:extLst>
           </p:cNvPr>
@@ -8462,54 +8486,7 @@
         </p:nvSpPr>
         <p:spPr>
           <a:xfrm>
-            <a:off x="7875105" y="1053541"/>
-            <a:ext cx="493645" cy="424069"/>
-          </a:xfrm>
-          <a:prstGeom prst="rect">
-            <a:avLst/>
-          </a:prstGeom>
-        </p:spPr>
-        <p:style>
-          <a:lnRef idx="2">
-            <a:schemeClr val="accent3"/>
-          </a:lnRef>
-          <a:fillRef idx="1">
-            <a:schemeClr val="lt1"/>
-          </a:fillRef>
-          <a:effectRef idx="0">
-            <a:schemeClr val="accent3"/>
-          </a:effectRef>
-          <a:fontRef idx="minor">
-            <a:schemeClr val="dk1"/>
-          </a:fontRef>
-        </p:style>
-        <p:txBody>
-          <a:bodyPr rtlCol="0" anchor="ctr"/>
-          <a:lstStyle/>
-          <a:p>
-            <a:pPr algn="ctr"/>
-            <a:r>
-              <a:rPr lang="es-MX" dirty="0"/>
-              <a:t>Sí</a:t>
-            </a:r>
-          </a:p>
-        </p:txBody>
-      </p:sp>
-      <p:sp>
-        <p:nvSpPr>
-          <p:cNvPr id="23" name="Rectángulo 22">
-            <a:extLst>
-              <a:ext uri="{FF2B5EF4-FFF2-40B4-BE49-F238E27FC236}">
-                <a16:creationId xmlns:a16="http://schemas.microsoft.com/office/drawing/2014/main" id="{21563E7D-84B4-47FF-B154-41AAFC5B9703}"/>
-              </a:ext>
-            </a:extLst>
-          </p:cNvPr>
-          <p:cNvSpPr/>
-          <p:nvPr/>
-        </p:nvSpPr>
-        <p:spPr>
-          <a:xfrm>
-            <a:off x="9737035" y="1053542"/>
+            <a:off x="10044331" y="1798978"/>
             <a:ext cx="493644" cy="424069"/>
           </a:xfrm>
           <a:prstGeom prst="rect">
@@ -8552,18 +8529,22 @@
             </a:extLst>
           </p:cNvPr>
           <p:cNvCxnSpPr>
-            <a:stCxn id="19" idx="2"/>
+            <a:cxnSpLocks/>
+            <a:stCxn id="31" idx="1"/>
             <a:endCxn id="21" idx="0"/>
           </p:cNvCxnSpPr>
           <p:nvPr/>
         </p:nvCxnSpPr>
         <p:spPr>
-          <a:xfrm rot="5400000">
-            <a:off x="8457377" y="472934"/>
-            <a:ext cx="245159" cy="916055"/>
-          </a:xfrm>
-          <a:prstGeom prst="bentConnector3">
-            <a:avLst/>
+          <a:xfrm rot="10800000" flipH="1" flipV="1">
+            <a:off x="7746737" y="841509"/>
+            <a:ext cx="395069" cy="887880"/>
+          </a:xfrm>
+          <a:prstGeom prst="bentConnector4">
+            <a:avLst>
+              <a:gd name="adj1" fmla="val -57863"/>
+              <a:gd name="adj2" fmla="val 69497"/>
+            </a:avLst>
           </a:prstGeom>
           <a:ln>
             <a:solidFill>
@@ -8597,17 +8578,18 @@
             </a:extLst>
           </p:cNvPr>
           <p:cNvCxnSpPr>
-            <a:stCxn id="19" idx="2"/>
+            <a:cxnSpLocks/>
+            <a:stCxn id="31" idx="3"/>
             <a:endCxn id="23" idx="0"/>
           </p:cNvCxnSpPr>
           <p:nvPr/>
         </p:nvCxnSpPr>
         <p:spPr>
-          <a:xfrm rot="16200000" flipH="1">
-            <a:off x="9388340" y="458025"/>
-            <a:ext cx="245160" cy="945874"/>
-          </a:xfrm>
-          <a:prstGeom prst="bentConnector3">
+          <a:xfrm>
+            <a:off x="10284529" y="841509"/>
+            <a:ext cx="6624" cy="957469"/>
+          </a:xfrm>
+          <a:prstGeom prst="bentConnector2">
             <a:avLst/>
           </a:prstGeom>
           <a:ln>
@@ -8643,7 +8625,7 @@
         </p:nvSpPr>
         <p:spPr>
           <a:xfrm>
-            <a:off x="7422874" y="1722769"/>
+            <a:off x="7411696" y="2710063"/>
             <a:ext cx="1398105" cy="424069"/>
           </a:xfrm>
           <a:prstGeom prst="rect">
@@ -8693,8 +8675,8 @@
         </p:nvCxnSpPr>
         <p:spPr>
           <a:xfrm flipH="1">
-            <a:off x="8121927" y="1477610"/>
-            <a:ext cx="1" cy="245159"/>
+            <a:off x="8110749" y="2153458"/>
+            <a:ext cx="31058" cy="556605"/>
           </a:xfrm>
           <a:prstGeom prst="straightConnector1">
             <a:avLst/>
@@ -8721,6 +8703,100 @@
           </a:fontRef>
         </p:style>
       </p:cxnSp>
+      <p:sp>
+        <p:nvSpPr>
+          <p:cNvPr id="2" name="Diagrama de flujo: decisión 1">
+            <a:extLst>
+              <a:ext uri="{FF2B5EF4-FFF2-40B4-BE49-F238E27FC236}">
+                <a16:creationId xmlns:a16="http://schemas.microsoft.com/office/drawing/2014/main" id="{32877B18-BEB2-4A10-85CE-DE97A9E72DC9}"/>
+              </a:ext>
+            </a:extLst>
+          </p:cNvPr>
+          <p:cNvSpPr/>
+          <p:nvPr/>
+        </p:nvSpPr>
+        <p:spPr>
+          <a:xfrm>
+            <a:off x="3299380" y="1106552"/>
+            <a:ext cx="2537791" cy="692426"/>
+          </a:xfrm>
+          <a:prstGeom prst="flowChartDecision">
+            <a:avLst/>
+          </a:prstGeom>
+        </p:spPr>
+        <p:style>
+          <a:lnRef idx="2">
+            <a:schemeClr val="accent3"/>
+          </a:lnRef>
+          <a:fillRef idx="1">
+            <a:schemeClr val="lt1"/>
+          </a:fillRef>
+          <a:effectRef idx="0">
+            <a:schemeClr val="accent3"/>
+          </a:effectRef>
+          <a:fontRef idx="minor">
+            <a:schemeClr val="dk1"/>
+          </a:fontRef>
+        </p:style>
+        <p:txBody>
+          <a:bodyPr rtlCol="0" anchor="ctr"/>
+          <a:lstStyle/>
+          <a:p>
+            <a:pPr algn="ctr"/>
+            <a:r>
+              <a:rPr lang="es-MX" dirty="0"/>
+              <a:t>Enfrentarla</a:t>
+            </a:r>
+          </a:p>
+        </p:txBody>
+      </p:sp>
+      <p:sp>
+        <p:nvSpPr>
+          <p:cNvPr id="31" name="Diagrama de flujo: decisión 30">
+            <a:extLst>
+              <a:ext uri="{FF2B5EF4-FFF2-40B4-BE49-F238E27FC236}">
+                <a16:creationId xmlns:a16="http://schemas.microsoft.com/office/drawing/2014/main" id="{8471CCE7-D9D9-4023-B0D6-97F0C58B10DE}"/>
+              </a:ext>
+            </a:extLst>
+          </p:cNvPr>
+          <p:cNvSpPr/>
+          <p:nvPr/>
+        </p:nvSpPr>
+        <p:spPr>
+          <a:xfrm>
+            <a:off x="7746738" y="495296"/>
+            <a:ext cx="2537791" cy="692426"/>
+          </a:xfrm>
+          <a:prstGeom prst="flowChartDecision">
+            <a:avLst/>
+          </a:prstGeom>
+        </p:spPr>
+        <p:style>
+          <a:lnRef idx="2">
+            <a:schemeClr val="accent3"/>
+          </a:lnRef>
+          <a:fillRef idx="1">
+            <a:schemeClr val="lt1"/>
+          </a:fillRef>
+          <a:effectRef idx="0">
+            <a:schemeClr val="accent3"/>
+          </a:effectRef>
+          <a:fontRef idx="minor">
+            <a:schemeClr val="dk1"/>
+          </a:fontRef>
+        </p:style>
+        <p:txBody>
+          <a:bodyPr rtlCol="0" anchor="ctr"/>
+          <a:lstStyle/>
+          <a:p>
+            <a:pPr algn="ctr"/>
+            <a:r>
+              <a:rPr lang="es-MX" dirty="0"/>
+              <a:t>Ir con mamá</a:t>
+            </a:r>
+          </a:p>
+        </p:txBody>
+      </p:sp>
     </p:spTree>
     <p:extLst>
       <p:ext uri="{BB962C8B-B14F-4D97-AF65-F5344CB8AC3E}">

</xml_diff>